<commit_message>
Cockroach debugging after family test
</commit_message>
<xml_diff>
--- a/docs/Redis.pptx
+++ b/docs/Redis.pptx
@@ -112,6 +112,11 @@
       </a:defRPr>
     </a:lvl9pPr>
   </p:defaultTextStyle>
+  <p:extLst>
+    <p:ext uri="{EFAFB233-063F-42B5-8137-9DF3F51BA10A}">
+      <p15:sldGuideLst xmlns:p15="http://schemas.microsoft.com/office/powerpoint/2012/main"/>
+    </p:ext>
+  </p:extLst>
 </p:presentation>
 </file>
 
@@ -128,7 +133,7 @@
   <pc:docChgLst>
     <pc:chgData name="Tegan Counts" userId="b2f4c86b45f7f6c0" providerId="LiveId" clId="{D522CCA9-E551-40FE-B479-5F51B8E0CA6C}"/>
     <pc:docChg chg="undo custSel addSld delSld modSld sldOrd">
-      <pc:chgData name="Tegan Counts" userId="b2f4c86b45f7f6c0" providerId="LiveId" clId="{D522CCA9-E551-40FE-B479-5F51B8E0CA6C}" dt="2022-07-31T16:07:22.490" v="1983" actId="20577"/>
+      <pc:chgData name="Tegan Counts" userId="b2f4c86b45f7f6c0" providerId="LiveId" clId="{D522CCA9-E551-40FE-B479-5F51B8E0CA6C}" dt="2022-08-08T04:06:30.366" v="2036" actId="20577"/>
       <pc:docMkLst>
         <pc:docMk/>
       </pc:docMkLst>
@@ -163,13 +168,13 @@
         </pc:graphicFrameChg>
       </pc:sldChg>
       <pc:sldChg chg="modSp add mod">
-        <pc:chgData name="Tegan Counts" userId="b2f4c86b45f7f6c0" providerId="LiveId" clId="{D522CCA9-E551-40FE-B479-5F51B8E0CA6C}" dt="2022-07-31T14:31:33.923" v="1464" actId="20577"/>
+        <pc:chgData name="Tegan Counts" userId="b2f4c86b45f7f6c0" providerId="LiveId" clId="{D522CCA9-E551-40FE-B479-5F51B8E0CA6C}" dt="2022-08-08T04:06:30.366" v="2036" actId="20577"/>
         <pc:sldMkLst>
           <pc:docMk/>
           <pc:sldMk cId="320344670" sldId="259"/>
         </pc:sldMkLst>
         <pc:graphicFrameChg chg="mod modGraphic">
-          <ac:chgData name="Tegan Counts" userId="b2f4c86b45f7f6c0" providerId="LiveId" clId="{D522CCA9-E551-40FE-B479-5F51B8E0CA6C}" dt="2022-07-31T14:31:33.923" v="1464" actId="20577"/>
+          <ac:chgData name="Tegan Counts" userId="b2f4c86b45f7f6c0" providerId="LiveId" clId="{D522CCA9-E551-40FE-B479-5F51B8E0CA6C}" dt="2022-08-08T04:06:30.366" v="2036" actId="20577"/>
           <ac:graphicFrameMkLst>
             <pc:docMk/>
             <pc:sldMk cId="320344670" sldId="259"/>
@@ -419,7 +424,7 @@
           <a:p>
             <a:fld id="{B96A9904-3C6C-4E30-BFE7-582D2B57479E}" type="datetimeFigureOut">
               <a:rPr lang="en-US" smtClean="0"/>
-              <a:t>7/30/2022</a:t>
+              <a:t>8/7/2022</a:t>
             </a:fld>
             <a:endParaRPr lang="en-US"/>
           </a:p>
@@ -617,7 +622,7 @@
           <a:p>
             <a:fld id="{B96A9904-3C6C-4E30-BFE7-582D2B57479E}" type="datetimeFigureOut">
               <a:rPr lang="en-US" smtClean="0"/>
-              <a:t>7/30/2022</a:t>
+              <a:t>8/7/2022</a:t>
             </a:fld>
             <a:endParaRPr lang="en-US"/>
           </a:p>
@@ -825,7 +830,7 @@
           <a:p>
             <a:fld id="{B96A9904-3C6C-4E30-BFE7-582D2B57479E}" type="datetimeFigureOut">
               <a:rPr lang="en-US" smtClean="0"/>
-              <a:t>7/30/2022</a:t>
+              <a:t>8/7/2022</a:t>
             </a:fld>
             <a:endParaRPr lang="en-US"/>
           </a:p>
@@ -1023,7 +1028,7 @@
           <a:p>
             <a:fld id="{B96A9904-3C6C-4E30-BFE7-582D2B57479E}" type="datetimeFigureOut">
               <a:rPr lang="en-US" smtClean="0"/>
-              <a:t>7/30/2022</a:t>
+              <a:t>8/7/2022</a:t>
             </a:fld>
             <a:endParaRPr lang="en-US"/>
           </a:p>
@@ -1298,7 +1303,7 @@
           <a:p>
             <a:fld id="{B96A9904-3C6C-4E30-BFE7-582D2B57479E}" type="datetimeFigureOut">
               <a:rPr lang="en-US" smtClean="0"/>
-              <a:t>7/30/2022</a:t>
+              <a:t>8/7/2022</a:t>
             </a:fld>
             <a:endParaRPr lang="en-US"/>
           </a:p>
@@ -1563,7 +1568,7 @@
           <a:p>
             <a:fld id="{B96A9904-3C6C-4E30-BFE7-582D2B57479E}" type="datetimeFigureOut">
               <a:rPr lang="en-US" smtClean="0"/>
-              <a:t>7/30/2022</a:t>
+              <a:t>8/7/2022</a:t>
             </a:fld>
             <a:endParaRPr lang="en-US"/>
           </a:p>
@@ -1975,7 +1980,7 @@
           <a:p>
             <a:fld id="{B96A9904-3C6C-4E30-BFE7-582D2B57479E}" type="datetimeFigureOut">
               <a:rPr lang="en-US" smtClean="0"/>
-              <a:t>7/30/2022</a:t>
+              <a:t>8/7/2022</a:t>
             </a:fld>
             <a:endParaRPr lang="en-US"/>
           </a:p>
@@ -2116,7 +2121,7 @@
           <a:p>
             <a:fld id="{B96A9904-3C6C-4E30-BFE7-582D2B57479E}" type="datetimeFigureOut">
               <a:rPr lang="en-US" smtClean="0"/>
-              <a:t>7/30/2022</a:t>
+              <a:t>8/7/2022</a:t>
             </a:fld>
             <a:endParaRPr lang="en-US"/>
           </a:p>
@@ -2229,7 +2234,7 @@
           <a:p>
             <a:fld id="{B96A9904-3C6C-4E30-BFE7-582D2B57479E}" type="datetimeFigureOut">
               <a:rPr lang="en-US" smtClean="0"/>
-              <a:t>7/30/2022</a:t>
+              <a:t>8/7/2022</a:t>
             </a:fld>
             <a:endParaRPr lang="en-US"/>
           </a:p>
@@ -2540,7 +2545,7 @@
           <a:p>
             <a:fld id="{B96A9904-3C6C-4E30-BFE7-582D2B57479E}" type="datetimeFigureOut">
               <a:rPr lang="en-US" smtClean="0"/>
-              <a:t>7/30/2022</a:t>
+              <a:t>8/7/2022</a:t>
             </a:fld>
             <a:endParaRPr lang="en-US"/>
           </a:p>
@@ -2828,7 +2833,7 @@
           <a:p>
             <a:fld id="{B96A9904-3C6C-4E30-BFE7-582D2B57479E}" type="datetimeFigureOut">
               <a:rPr lang="en-US" smtClean="0"/>
-              <a:t>7/30/2022</a:t>
+              <a:t>8/7/2022</a:t>
             </a:fld>
             <a:endParaRPr lang="en-US"/>
           </a:p>
@@ -3069,7 +3074,7 @@
           <a:p>
             <a:fld id="{B96A9904-3C6C-4E30-BFE7-582D2B57479E}" type="datetimeFigureOut">
               <a:rPr lang="en-US" smtClean="0"/>
-              <a:t>7/30/2022</a:t>
+              <a:t>8/7/2022</a:t>
             </a:fld>
             <a:endParaRPr lang="en-US"/>
           </a:p>
@@ -6171,7 +6176,7 @@
             <p:ph idx="4294967295"/>
             <p:extLst>
               <p:ext uri="{D42A27DB-BD31-4B8C-83A1-F6EECF244321}">
-                <p14:modId xmlns:p14="http://schemas.microsoft.com/office/powerpoint/2010/main" val="2864520607"/>
+                <p14:modId xmlns:p14="http://schemas.microsoft.com/office/powerpoint/2010/main" val="1039082314"/>
               </p:ext>
             </p:extLst>
           </p:nvPr>
@@ -6745,8 +6750,21 @@
                     <a:lstStyle/>
                     <a:p>
                       <a:r>
-                        <a:rPr lang="en-US" sz="1400" dirty="0"/>
-                        <a:t>harvest CU</a:t>
+                        <a:rPr lang="en-US" sz="1400"/>
+                        <a:t>group CUD</a:t>
+                      </a:r>
+                    </a:p>
+                    <a:p>
+                      <a:endParaRPr lang="en-US" sz="1400" dirty="0"/>
+                    </a:p>
+                    <a:p>
+                      <a:r>
+                        <a:rPr lang="en-US" sz="1400" dirty="0" err="1"/>
+                        <a:t>harvest_update_time</a:t>
+                      </a:r>
+                      <a:r>
+                        <a:rPr lang="en-US" sz="1400" dirty="0"/>
+                        <a:t> change in harvests</a:t>
                       </a:r>
                     </a:p>
                   </a:txBody>

</xml_diff>

<commit_message>
post prototype party upgrades
</commit_message>
<xml_diff>
--- a/docs/Redis.pptx
+++ b/docs/Redis.pptx
@@ -14,6 +14,7 @@
     <p:sldId id="264" r:id="rId8"/>
     <p:sldId id="263" r:id="rId9"/>
     <p:sldId id="262" r:id="rId10"/>
+    <p:sldId id="265" r:id="rId11"/>
   </p:sldIdLst>
   <p:sldSz cx="12192000" cy="6858000"/>
   <p:notesSz cx="6858000" cy="9144000"/>
@@ -123,7 +124,7 @@
 <file path=ppt/revisionInfo.xml><?xml version="1.0" encoding="utf-8"?>
 <p1510:revInfo xmlns:a="http://schemas.openxmlformats.org/drawingml/2006/main" xmlns:r="http://schemas.openxmlformats.org/officeDocument/2006/relationships" xmlns:p1510="http://schemas.microsoft.com/office/powerpoint/2015/10/main">
   <p1510:revLst>
-    <p1510:client id="{D522CCA9-E551-40FE-B479-5F51B8E0CA6C}" v="88" dt="2022-07-31T15:54:15.753"/>
+    <p1510:client id="{D522CCA9-E551-40FE-B479-5F51B8E0CA6C}" v="93" dt="2022-08-13T13:35:32.296"/>
   </p1510:revLst>
 </p1510:revInfo>
 </file>
@@ -133,7 +134,7 @@
   <pc:docChgLst>
     <pc:chgData name="Tegan Counts" userId="b2f4c86b45f7f6c0" providerId="LiveId" clId="{D522CCA9-E551-40FE-B479-5F51B8E0CA6C}"/>
     <pc:docChg chg="undo custSel addSld delSld modSld sldOrd">
-      <pc:chgData name="Tegan Counts" userId="b2f4c86b45f7f6c0" providerId="LiveId" clId="{D522CCA9-E551-40FE-B479-5F51B8E0CA6C}" dt="2022-08-08T04:06:30.366" v="2036" actId="20577"/>
+      <pc:chgData name="Tegan Counts" userId="b2f4c86b45f7f6c0" providerId="LiveId" clId="{D522CCA9-E551-40FE-B479-5F51B8E0CA6C}" dt="2022-08-13T13:41:57.642" v="2184" actId="6549"/>
       <pc:docMkLst>
         <pc:docMk/>
       </pc:docMkLst>
@@ -268,6 +269,21 @@
           <ac:graphicFrameMkLst>
             <pc:docMk/>
             <pc:sldMk cId="1364438841" sldId="264"/>
+            <ac:graphicFrameMk id="4" creationId="{6E091AF2-00E4-4D5A-87FD-D153C81F4D1A}"/>
+          </ac:graphicFrameMkLst>
+        </pc:graphicFrameChg>
+      </pc:sldChg>
+      <pc:sldChg chg="modSp add mod">
+        <pc:chgData name="Tegan Counts" userId="b2f4c86b45f7f6c0" providerId="LiveId" clId="{D522CCA9-E551-40FE-B479-5F51B8E0CA6C}" dt="2022-08-13T13:41:57.642" v="2184" actId="6549"/>
+        <pc:sldMkLst>
+          <pc:docMk/>
+          <pc:sldMk cId="20777508" sldId="265"/>
+        </pc:sldMkLst>
+        <pc:graphicFrameChg chg="mod modGraphic">
+          <ac:chgData name="Tegan Counts" userId="b2f4c86b45f7f6c0" providerId="LiveId" clId="{D522CCA9-E551-40FE-B479-5F51B8E0CA6C}" dt="2022-08-13T13:41:57.642" v="2184" actId="6549"/>
+          <ac:graphicFrameMkLst>
+            <pc:docMk/>
+            <pc:sldMk cId="20777508" sldId="265"/>
             <ac:graphicFrameMk id="4" creationId="{6E091AF2-00E4-4D5A-87FD-D153C81F4D1A}"/>
           </ac:graphicFrameMkLst>
         </pc:graphicFrameChg>
@@ -424,7 +440,7 @@
           <a:p>
             <a:fld id="{B96A9904-3C6C-4E30-BFE7-582D2B57479E}" type="datetimeFigureOut">
               <a:rPr lang="en-US" smtClean="0"/>
-              <a:t>8/7/2022</a:t>
+              <a:t>8/13/2022</a:t>
             </a:fld>
             <a:endParaRPr lang="en-US"/>
           </a:p>
@@ -622,7 +638,7 @@
           <a:p>
             <a:fld id="{B96A9904-3C6C-4E30-BFE7-582D2B57479E}" type="datetimeFigureOut">
               <a:rPr lang="en-US" smtClean="0"/>
-              <a:t>8/7/2022</a:t>
+              <a:t>8/13/2022</a:t>
             </a:fld>
             <a:endParaRPr lang="en-US"/>
           </a:p>
@@ -830,7 +846,7 @@
           <a:p>
             <a:fld id="{B96A9904-3C6C-4E30-BFE7-582D2B57479E}" type="datetimeFigureOut">
               <a:rPr lang="en-US" smtClean="0"/>
-              <a:t>8/7/2022</a:t>
+              <a:t>8/13/2022</a:t>
             </a:fld>
             <a:endParaRPr lang="en-US"/>
           </a:p>
@@ -1028,7 +1044,7 @@
           <a:p>
             <a:fld id="{B96A9904-3C6C-4E30-BFE7-582D2B57479E}" type="datetimeFigureOut">
               <a:rPr lang="en-US" smtClean="0"/>
-              <a:t>8/7/2022</a:t>
+              <a:t>8/13/2022</a:t>
             </a:fld>
             <a:endParaRPr lang="en-US"/>
           </a:p>
@@ -1303,7 +1319,7 @@
           <a:p>
             <a:fld id="{B96A9904-3C6C-4E30-BFE7-582D2B57479E}" type="datetimeFigureOut">
               <a:rPr lang="en-US" smtClean="0"/>
-              <a:t>8/7/2022</a:t>
+              <a:t>8/13/2022</a:t>
             </a:fld>
             <a:endParaRPr lang="en-US"/>
           </a:p>
@@ -1568,7 +1584,7 @@
           <a:p>
             <a:fld id="{B96A9904-3C6C-4E30-BFE7-582D2B57479E}" type="datetimeFigureOut">
               <a:rPr lang="en-US" smtClean="0"/>
-              <a:t>8/7/2022</a:t>
+              <a:t>8/13/2022</a:t>
             </a:fld>
             <a:endParaRPr lang="en-US"/>
           </a:p>
@@ -1980,7 +1996,7 @@
           <a:p>
             <a:fld id="{B96A9904-3C6C-4E30-BFE7-582D2B57479E}" type="datetimeFigureOut">
               <a:rPr lang="en-US" smtClean="0"/>
-              <a:t>8/7/2022</a:t>
+              <a:t>8/13/2022</a:t>
             </a:fld>
             <a:endParaRPr lang="en-US"/>
           </a:p>
@@ -2121,7 +2137,7 @@
           <a:p>
             <a:fld id="{B96A9904-3C6C-4E30-BFE7-582D2B57479E}" type="datetimeFigureOut">
               <a:rPr lang="en-US" smtClean="0"/>
-              <a:t>8/7/2022</a:t>
+              <a:t>8/13/2022</a:t>
             </a:fld>
             <a:endParaRPr lang="en-US"/>
           </a:p>
@@ -2234,7 +2250,7 @@
           <a:p>
             <a:fld id="{B96A9904-3C6C-4E30-BFE7-582D2B57479E}" type="datetimeFigureOut">
               <a:rPr lang="en-US" smtClean="0"/>
-              <a:t>8/7/2022</a:t>
+              <a:t>8/13/2022</a:t>
             </a:fld>
             <a:endParaRPr lang="en-US"/>
           </a:p>
@@ -2545,7 +2561,7 @@
           <a:p>
             <a:fld id="{B96A9904-3C6C-4E30-BFE7-582D2B57479E}" type="datetimeFigureOut">
               <a:rPr lang="en-US" smtClean="0"/>
-              <a:t>8/7/2022</a:t>
+              <a:t>8/13/2022</a:t>
             </a:fld>
             <a:endParaRPr lang="en-US"/>
           </a:p>
@@ -2833,7 +2849,7 @@
           <a:p>
             <a:fld id="{B96A9904-3C6C-4E30-BFE7-582D2B57479E}" type="datetimeFigureOut">
               <a:rPr lang="en-US" smtClean="0"/>
-              <a:t>8/7/2022</a:t>
+              <a:t>8/13/2022</a:t>
             </a:fld>
             <a:endParaRPr lang="en-US"/>
           </a:p>
@@ -3074,7 +3090,7 @@
           <a:p>
             <a:fld id="{B96A9904-3C6C-4E30-BFE7-582D2B57479E}" type="datetimeFigureOut">
               <a:rPr lang="en-US" smtClean="0"/>
-              <a:t>8/7/2022</a:t>
+              <a:t>8/13/2022</a:t>
             </a:fld>
             <a:endParaRPr lang="en-US"/>
           </a:p>
@@ -3554,6 +3570,555 @@
 </p:sld>
 </file>
 
+<file path=ppt/slides/slide10.xml><?xml version="1.0" encoding="utf-8"?>
+<p:sld xmlns:a="http://schemas.openxmlformats.org/drawingml/2006/main" xmlns:r="http://schemas.openxmlformats.org/officeDocument/2006/relationships" xmlns:p="http://schemas.openxmlformats.org/presentationml/2006/main">
+  <p:cSld>
+    <p:spTree>
+      <p:nvGrpSpPr>
+        <p:cNvPr id="1" name=""/>
+        <p:cNvGrpSpPr/>
+        <p:nvPr/>
+      </p:nvGrpSpPr>
+      <p:grpSpPr>
+        <a:xfrm>
+          <a:off x="0" y="0"/>
+          <a:ext cx="0" cy="0"/>
+          <a:chOff x="0" y="0"/>
+          <a:chExt cx="0" cy="0"/>
+        </a:xfrm>
+      </p:grpSpPr>
+      <p:graphicFrame>
+        <p:nvGraphicFramePr>
+          <p:cNvPr id="4" name="Table 4">
+            <a:extLst>
+              <a:ext uri="{FF2B5EF4-FFF2-40B4-BE49-F238E27FC236}">
+                <a16:creationId xmlns:a16="http://schemas.microsoft.com/office/drawing/2014/main" id="{6E091AF2-00E4-4D5A-87FD-D153C81F4D1A}"/>
+              </a:ext>
+            </a:extLst>
+          </p:cNvPr>
+          <p:cNvGraphicFramePr>
+            <a:graphicFrameLocks noGrp="1"/>
+          </p:cNvGraphicFramePr>
+          <p:nvPr>
+            <p:ph idx="4294967295"/>
+            <p:extLst>
+              <p:ext uri="{D42A27DB-BD31-4B8C-83A1-F6EECF244321}">
+                <p14:modId xmlns:p14="http://schemas.microsoft.com/office/powerpoint/2010/main" val="4254707994"/>
+              </p:ext>
+            </p:extLst>
+          </p:nvPr>
+        </p:nvGraphicFramePr>
+        <p:xfrm>
+          <a:off x="339281" y="241300"/>
+          <a:ext cx="11330559" cy="2397760"/>
+        </p:xfrm>
+        <a:graphic>
+          <a:graphicData uri="http://schemas.openxmlformats.org/drawingml/2006/table">
+            <a:tbl>
+              <a:tblPr firstRow="1" bandRow="1">
+                <a:tableStyleId>{5940675A-B579-460E-94D1-54222C63F5DA}</a:tableStyleId>
+              </a:tblPr>
+              <a:tblGrid>
+                <a:gridCol w="997839">
+                  <a:extLst>
+                    <a:ext uri="{9D8B030D-6E8A-4147-A177-3AD203B41FA5}">
+                      <a16:colId xmlns:a16="http://schemas.microsoft.com/office/drawing/2014/main" val="650972074"/>
+                    </a:ext>
+                  </a:extLst>
+                </a:gridCol>
+                <a:gridCol w="6400800">
+                  <a:extLst>
+                    <a:ext uri="{9D8B030D-6E8A-4147-A177-3AD203B41FA5}">
+                      <a16:colId xmlns:a16="http://schemas.microsoft.com/office/drawing/2014/main" val="3347763763"/>
+                    </a:ext>
+                  </a:extLst>
+                </a:gridCol>
+                <a:gridCol w="1188720">
+                  <a:extLst>
+                    <a:ext uri="{9D8B030D-6E8A-4147-A177-3AD203B41FA5}">
+                      <a16:colId xmlns:a16="http://schemas.microsoft.com/office/drawing/2014/main" val="2334996347"/>
+                    </a:ext>
+                  </a:extLst>
+                </a:gridCol>
+                <a:gridCol w="1097280">
+                  <a:extLst>
+                    <a:ext uri="{9D8B030D-6E8A-4147-A177-3AD203B41FA5}">
+                      <a16:colId xmlns:a16="http://schemas.microsoft.com/office/drawing/2014/main" val="510532850"/>
+                    </a:ext>
+                  </a:extLst>
+                </a:gridCol>
+                <a:gridCol w="1645920">
+                  <a:extLst>
+                    <a:ext uri="{9D8B030D-6E8A-4147-A177-3AD203B41FA5}">
+                      <a16:colId xmlns:a16="http://schemas.microsoft.com/office/drawing/2014/main" val="1544489523"/>
+                    </a:ext>
+                  </a:extLst>
+                </a:gridCol>
+              </a:tblGrid>
+              <a:tr h="370840">
+                <a:tc>
+                  <a:txBody>
+                    <a:bodyPr/>
+                    <a:lstStyle/>
+                    <a:p>
+                      <a:r>
+                        <a:rPr lang="en-US" sz="1600" dirty="0"/>
+                        <a:t>API</a:t>
+                      </a:r>
+                    </a:p>
+                  </a:txBody>
+                  <a:tcPr/>
+                </a:tc>
+                <a:tc>
+                  <a:txBody>
+                    <a:bodyPr/>
+                    <a:lstStyle/>
+                    <a:p>
+                      <a:r>
+                        <a:rPr lang="en-US" sz="1600" dirty="0"/>
+                        <a:t>huntss.py</a:t>
+                      </a:r>
+                    </a:p>
+                  </a:txBody>
+                  <a:tcPr/>
+                </a:tc>
+                <a:tc>
+                  <a:txBody>
+                    <a:bodyPr/>
+                    <a:lstStyle/>
+                    <a:p>
+                      <a:endParaRPr lang="en-US" sz="1600" dirty="0"/>
+                    </a:p>
+                  </a:txBody>
+                  <a:tcPr/>
+                </a:tc>
+                <a:tc>
+                  <a:txBody>
+                    <a:bodyPr/>
+                    <a:lstStyle/>
+                    <a:p>
+                      <a:endParaRPr lang="en-US" sz="1600" dirty="0"/>
+                    </a:p>
+                  </a:txBody>
+                  <a:tcPr/>
+                </a:tc>
+                <a:tc>
+                  <a:txBody>
+                    <a:bodyPr/>
+                    <a:lstStyle/>
+                    <a:p>
+                      <a:endParaRPr lang="en-US" sz="1600" dirty="0"/>
+                    </a:p>
+                  </a:txBody>
+                  <a:tcPr/>
+                </a:tc>
+                <a:extLst>
+                  <a:ext uri="{0D108BD9-81ED-4DB2-BD59-A6C34878D82A}">
+                    <a16:rowId xmlns:a16="http://schemas.microsoft.com/office/drawing/2014/main" val="1412316110"/>
+                  </a:ext>
+                </a:extLst>
+              </a:tr>
+              <a:tr h="370840">
+                <a:tc>
+                  <a:txBody>
+                    <a:bodyPr/>
+                    <a:lstStyle/>
+                    <a:p>
+                      <a:r>
+                        <a:rPr lang="en-US" sz="1600" dirty="0"/>
+                        <a:t>method</a:t>
+                      </a:r>
+                    </a:p>
+                  </a:txBody>
+                  <a:tcPr/>
+                </a:tc>
+                <a:tc>
+                  <a:txBody>
+                    <a:bodyPr/>
+                    <a:lstStyle/>
+                    <a:p>
+                      <a:r>
+                        <a:rPr lang="en-US" sz="1600" dirty="0" err="1"/>
+                        <a:t>get_all_active</a:t>
+                      </a:r>
+                      <a:endParaRPr lang="en-US" sz="1600" dirty="0"/>
+                    </a:p>
+                  </a:txBody>
+                  <a:tcPr/>
+                </a:tc>
+                <a:tc>
+                  <a:txBody>
+                    <a:bodyPr/>
+                    <a:lstStyle/>
+                    <a:p>
+                      <a:endParaRPr lang="en-US" sz="1600" dirty="0"/>
+                    </a:p>
+                  </a:txBody>
+                  <a:tcPr/>
+                </a:tc>
+                <a:tc>
+                  <a:txBody>
+                    <a:bodyPr/>
+                    <a:lstStyle/>
+                    <a:p>
+                      <a:endParaRPr lang="en-US" sz="1600" dirty="0"/>
+                    </a:p>
+                  </a:txBody>
+                  <a:tcPr/>
+                </a:tc>
+                <a:tc>
+                  <a:txBody>
+                    <a:bodyPr/>
+                    <a:lstStyle/>
+                    <a:p>
+                      <a:endParaRPr lang="en-US" sz="1600" dirty="0"/>
+                    </a:p>
+                  </a:txBody>
+                  <a:tcPr/>
+                </a:tc>
+                <a:extLst>
+                  <a:ext uri="{0D108BD9-81ED-4DB2-BD59-A6C34878D82A}">
+                    <a16:rowId xmlns:a16="http://schemas.microsoft.com/office/drawing/2014/main" val="82044336"/>
+                  </a:ext>
+                </a:extLst>
+              </a:tr>
+              <a:tr h="370840">
+                <a:tc>
+                  <a:txBody>
+                    <a:bodyPr/>
+                    <a:lstStyle/>
+                    <a:p>
+                      <a:r>
+                        <a:rPr lang="en-US" sz="1600" dirty="0"/>
+                        <a:t>route</a:t>
+                      </a:r>
+                    </a:p>
+                  </a:txBody>
+                  <a:tcPr/>
+                </a:tc>
+                <a:tc>
+                  <a:txBody>
+                    <a:bodyPr/>
+                    <a:lstStyle/>
+                    <a:p>
+                      <a:r>
+                        <a:rPr lang="en-US" sz="1600" dirty="0"/>
+                        <a:t>/hunts/active [GET]</a:t>
+                      </a:r>
+                    </a:p>
+                  </a:txBody>
+                  <a:tcPr/>
+                </a:tc>
+                <a:tc>
+                  <a:txBody>
+                    <a:bodyPr/>
+                    <a:lstStyle/>
+                    <a:p>
+                      <a:endParaRPr lang="en-US" sz="1600" dirty="0"/>
+                    </a:p>
+                  </a:txBody>
+                  <a:tcPr/>
+                </a:tc>
+                <a:tc>
+                  <a:txBody>
+                    <a:bodyPr/>
+                    <a:lstStyle/>
+                    <a:p>
+                      <a:endParaRPr lang="en-US" sz="1600" dirty="0"/>
+                    </a:p>
+                  </a:txBody>
+                  <a:tcPr/>
+                </a:tc>
+                <a:tc>
+                  <a:txBody>
+                    <a:bodyPr/>
+                    <a:lstStyle/>
+                    <a:p>
+                      <a:endParaRPr lang="en-US" sz="1600" dirty="0"/>
+                    </a:p>
+                  </a:txBody>
+                  <a:tcPr/>
+                </a:tc>
+                <a:extLst>
+                  <a:ext uri="{0D108BD9-81ED-4DB2-BD59-A6C34878D82A}">
+                    <a16:rowId xmlns:a16="http://schemas.microsoft.com/office/drawing/2014/main" val="4262540346"/>
+                  </a:ext>
+                </a:extLst>
+              </a:tr>
+              <a:tr h="370840">
+                <a:tc>
+                  <a:txBody>
+                    <a:bodyPr/>
+                    <a:lstStyle/>
+                    <a:p>
+                      <a:r>
+                        <a:rPr lang="en-US" sz="1600" dirty="0"/>
+                        <a:t>frontend </a:t>
+                      </a:r>
+                    </a:p>
+                    <a:p>
+                      <a:r>
+                        <a:rPr lang="en-US" sz="1600" dirty="0"/>
+                        <a:t>usage</a:t>
+                      </a:r>
+                    </a:p>
+                  </a:txBody>
+                  <a:tcPr/>
+                </a:tc>
+                <a:tc>
+                  <a:txBody>
+                    <a:bodyPr/>
+                    <a:lstStyle/>
+                    <a:p>
+                      <a:r>
+                        <a:rPr lang="en-US" sz="1600" dirty="0"/>
+                        <a:t>hunt</a:t>
+                      </a:r>
+                    </a:p>
+                  </a:txBody>
+                  <a:tcPr/>
+                </a:tc>
+                <a:tc>
+                  <a:txBody>
+                    <a:bodyPr/>
+                    <a:lstStyle/>
+                    <a:p>
+                      <a:endParaRPr lang="en-US" sz="1600" dirty="0"/>
+                    </a:p>
+                  </a:txBody>
+                  <a:tcPr/>
+                </a:tc>
+                <a:tc>
+                  <a:txBody>
+                    <a:bodyPr/>
+                    <a:lstStyle/>
+                    <a:p>
+                      <a:endParaRPr lang="en-US" sz="1600" dirty="0"/>
+                    </a:p>
+                  </a:txBody>
+                  <a:tcPr/>
+                </a:tc>
+                <a:tc>
+                  <a:txBody>
+                    <a:bodyPr/>
+                    <a:lstStyle/>
+                    <a:p>
+                      <a:endParaRPr lang="en-US" sz="1600" dirty="0"/>
+                    </a:p>
+                  </a:txBody>
+                  <a:tcPr/>
+                </a:tc>
+                <a:extLst>
+                  <a:ext uri="{0D108BD9-81ED-4DB2-BD59-A6C34878D82A}">
+                    <a16:rowId xmlns:a16="http://schemas.microsoft.com/office/drawing/2014/main" val="716380712"/>
+                  </a:ext>
+                </a:extLst>
+              </a:tr>
+              <a:tr h="370840">
+                <a:tc>
+                  <a:txBody>
+                    <a:bodyPr/>
+                    <a:lstStyle/>
+                    <a:p>
+                      <a:r>
+                        <a:rPr lang="en-US" sz="1600" dirty="0"/>
+                        <a:t>results</a:t>
+                      </a:r>
+                    </a:p>
+                  </a:txBody>
+                  <a:tcPr/>
+                </a:tc>
+                <a:tc>
+                  <a:txBody>
+                    <a:bodyPr/>
+                    <a:lstStyle/>
+                    <a:p>
+                      <a:pPr marL="0" marR="0" lvl="0" indent="0" algn="l" defTabSz="914400" rtl="0" eaLnBrk="1" fontAlgn="auto" latinLnBrk="0" hangingPunct="1">
+                        <a:lnSpc>
+                          <a:spcPct val="100000"/>
+                        </a:lnSpc>
+                        <a:spcBef>
+                          <a:spcPts val="0"/>
+                        </a:spcBef>
+                        <a:spcAft>
+                          <a:spcPts val="0"/>
+                        </a:spcAft>
+                        <a:buClrTx/>
+                        <a:buSzTx/>
+                        <a:buFontTx/>
+                        <a:buNone/>
+                        <a:tabLst/>
+                        <a:defRPr/>
+                      </a:pPr>
+                      <a:r>
+                        <a:rPr lang="en-US" sz="1600" dirty="0"/>
+                        <a:t>list of all hunts that aren’t closed (should only ever be 1)</a:t>
+                      </a:r>
+                    </a:p>
+                  </a:txBody>
+                  <a:tcPr/>
+                </a:tc>
+                <a:tc>
+                  <a:txBody>
+                    <a:bodyPr/>
+                    <a:lstStyle/>
+                    <a:p>
+                      <a:pPr algn="ctr"/>
+                      <a:r>
+                        <a:rPr lang="en-US" sz="1600" b="1" dirty="0"/>
+                        <a:t>Redis key</a:t>
+                      </a:r>
+                    </a:p>
+                  </a:txBody>
+                  <a:tcPr anchor="b"/>
+                </a:tc>
+                <a:tc>
+                  <a:txBody>
+                    <a:bodyPr/>
+                    <a:lstStyle/>
+                    <a:p>
+                      <a:pPr algn="ctr"/>
+                      <a:r>
+                        <a:rPr lang="en-US" sz="1600" b="1" dirty="0"/>
+                        <a:t>Expiration</a:t>
+                      </a:r>
+                    </a:p>
+                  </a:txBody>
+                  <a:tcPr anchor="b"/>
+                </a:tc>
+                <a:tc>
+                  <a:txBody>
+                    <a:bodyPr/>
+                    <a:lstStyle/>
+                    <a:p>
+                      <a:pPr algn="ctr"/>
+                      <a:r>
+                        <a:rPr lang="en-US" sz="1600" b="1" dirty="0"/>
+                        <a:t>Delete</a:t>
+                      </a:r>
+                    </a:p>
+                  </a:txBody>
+                  <a:tcPr anchor="b"/>
+                </a:tc>
+                <a:extLst>
+                  <a:ext uri="{0D108BD9-81ED-4DB2-BD59-A6C34878D82A}">
+                    <a16:rowId xmlns:a16="http://schemas.microsoft.com/office/drawing/2014/main" val="1516606734"/>
+                  </a:ext>
+                </a:extLst>
+              </a:tr>
+              <a:tr h="0">
+                <a:tc>
+                  <a:txBody>
+                    <a:bodyPr/>
+                    <a:lstStyle/>
+                    <a:p>
+                      <a:r>
+                        <a:rPr lang="en-US" sz="1600" dirty="0"/>
+                        <a:t>DB calls</a:t>
+                      </a:r>
+                    </a:p>
+                  </a:txBody>
+                  <a:tcPr/>
+                </a:tc>
+                <a:tc>
+                  <a:txBody>
+                    <a:bodyPr/>
+                    <a:lstStyle/>
+                    <a:p>
+                      <a:r>
+                        <a:rPr lang="en-US" sz="1400" dirty="0"/>
+                        <a:t>SELECT * FROM hunts </a:t>
+                      </a:r>
+                      <a:r>
+                        <a:rPr lang="en-US" sz="1400"/>
+                        <a:t>WHERE status </a:t>
+                      </a:r>
+                      <a:r>
+                        <a:rPr lang="en-US" sz="1400" dirty="0"/>
+                        <a:t>!= '</a:t>
+                      </a:r>
+                      <a:r>
+                        <a:rPr lang="en-US" sz="1400" dirty="0" err="1"/>
+                        <a:t>hunt_closed</a:t>
+                      </a:r>
+                      <a:r>
+                        <a:rPr lang="en-US" sz="1400" dirty="0"/>
+                        <a:t>' ORDER BY </a:t>
+                      </a:r>
+                      <a:r>
+                        <a:rPr lang="en-US" sz="1400" dirty="0" err="1"/>
+                        <a:t>hunt_date</a:t>
+                      </a:r>
+                      <a:endParaRPr lang="en-US" sz="1400" dirty="0"/>
+                    </a:p>
+                  </a:txBody>
+                  <a:tcPr/>
+                </a:tc>
+                <a:tc>
+                  <a:txBody>
+                    <a:bodyPr/>
+                    <a:lstStyle/>
+                    <a:p>
+                      <a:pPr algn="ctr"/>
+                      <a:r>
+                        <a:rPr lang="en-US" sz="1400" dirty="0" err="1"/>
+                        <a:t>sierra</a:t>
+                      </a:r>
+                      <a:endParaRPr lang="en-US" sz="1400" dirty="0"/>
+                    </a:p>
+                  </a:txBody>
+                  <a:tcPr marL="45720" marR="45720"/>
+                </a:tc>
+                <a:tc>
+                  <a:txBody>
+                    <a:bodyPr/>
+                    <a:lstStyle/>
+                    <a:p>
+                      <a:pPr algn="ctr"/>
+                      <a:r>
+                        <a:rPr lang="en-US" sz="1400" dirty="0"/>
+                        <a:t>1 day</a:t>
+                      </a:r>
+                    </a:p>
+                  </a:txBody>
+                  <a:tcPr marL="45720" marR="45720"/>
+                </a:tc>
+                <a:tc>
+                  <a:txBody>
+                    <a:bodyPr/>
+                    <a:lstStyle/>
+                    <a:p>
+                      <a:r>
+                        <a:rPr lang="en-US" sz="1400" dirty="0"/>
+                        <a:t>hunts CUD</a:t>
+                      </a:r>
+                    </a:p>
+                  </a:txBody>
+                  <a:tcPr marL="45720" marR="45720"/>
+                </a:tc>
+                <a:extLst>
+                  <a:ext uri="{0D108BD9-81ED-4DB2-BD59-A6C34878D82A}">
+                    <a16:rowId xmlns:a16="http://schemas.microsoft.com/office/drawing/2014/main" val="2130996453"/>
+                  </a:ext>
+                </a:extLst>
+              </a:tr>
+            </a:tbl>
+          </a:graphicData>
+        </a:graphic>
+      </p:graphicFrame>
+    </p:spTree>
+    <p:extLst>
+      <p:ext uri="{BB962C8B-B14F-4D97-AF65-F5344CB8AC3E}">
+        <p14:creationId xmlns:p14="http://schemas.microsoft.com/office/powerpoint/2010/main" val="20777508"/>
+      </p:ext>
+    </p:extLst>
+  </p:cSld>
+  <p:clrMapOvr>
+    <a:masterClrMapping/>
+  </p:clrMapOvr>
+</p:sld>
+</file>
+
 <file path=ppt/slides/slide2.xml><?xml version="1.0" encoding="utf-8"?>
 <p:sld xmlns:a="http://schemas.openxmlformats.org/drawingml/2006/main" xmlns:r="http://schemas.openxmlformats.org/officeDocument/2006/relationships" xmlns:p="http://schemas.openxmlformats.org/presentationml/2006/main">
   <p:cSld>

</xml_diff>

<commit_message>
Opening weekend upgrades and bug fixes
</commit_message>
<xml_diff>
--- a/docs/Redis.pptx
+++ b/docs/Redis.pptx
@@ -119,14 +119,6 @@
     </p:ext>
   </p:extLst>
 </p:presentation>
-</file>
-
-<file path=ppt/revisionInfo.xml><?xml version="1.0" encoding="utf-8"?>
-<p1510:revInfo xmlns:a="http://schemas.openxmlformats.org/drawingml/2006/main" xmlns:r="http://schemas.openxmlformats.org/officeDocument/2006/relationships" xmlns:p1510="http://schemas.microsoft.com/office/powerpoint/2015/10/main">
-  <p1510:revLst>
-    <p1510:client id="{D522CCA9-E551-40FE-B479-5F51B8E0CA6C}" v="93" dt="2022-08-13T13:35:32.296"/>
-  </p1510:revLst>
-</p1510:revInfo>
 </file>
 
 <file path=ppt/changesInfos/changesInfo1.xml><?xml version="1.0" encoding="utf-8"?>
@@ -290,6 +282,60 @@
       </pc:sldChg>
     </pc:docChg>
   </pc:docChgLst>
+  <pc:docChgLst>
+    <pc:chgData name="Tegan Counts" userId="b2f4c86b45f7f6c0" providerId="LiveId" clId="{6F9851D4-582D-44BF-8000-722E5CF6B962}"/>
+    <pc:docChg chg="modSld">
+      <pc:chgData name="Tegan Counts" userId="b2f4c86b45f7f6c0" providerId="LiveId" clId="{6F9851D4-582D-44BF-8000-722E5CF6B962}" dt="2022-09-13T03:09:05.744" v="40" actId="20577"/>
+      <pc:docMkLst>
+        <pc:docMk/>
+      </pc:docMkLst>
+      <pc:sldChg chg="modSp mod">
+        <pc:chgData name="Tegan Counts" userId="b2f4c86b45f7f6c0" providerId="LiveId" clId="{6F9851D4-582D-44BF-8000-722E5CF6B962}" dt="2022-09-13T03:09:05.744" v="40" actId="20577"/>
+        <pc:sldMkLst>
+          <pc:docMk/>
+          <pc:sldMk cId="320344670" sldId="259"/>
+        </pc:sldMkLst>
+        <pc:graphicFrameChg chg="modGraphic">
+          <ac:chgData name="Tegan Counts" userId="b2f4c86b45f7f6c0" providerId="LiveId" clId="{6F9851D4-582D-44BF-8000-722E5CF6B962}" dt="2022-09-13T03:09:05.744" v="40" actId="20577"/>
+          <ac:graphicFrameMkLst>
+            <pc:docMk/>
+            <pc:sldMk cId="320344670" sldId="259"/>
+            <ac:graphicFrameMk id="4" creationId="{6E091AF2-00E4-4D5A-87FD-D153C81F4D1A}"/>
+          </ac:graphicFrameMkLst>
+        </pc:graphicFrameChg>
+      </pc:sldChg>
+      <pc:sldChg chg="modSp mod">
+        <pc:chgData name="Tegan Counts" userId="b2f4c86b45f7f6c0" providerId="LiveId" clId="{6F9851D4-582D-44BF-8000-722E5CF6B962}" dt="2022-09-13T03:08:55.755" v="27" actId="20577"/>
+        <pc:sldMkLst>
+          <pc:docMk/>
+          <pc:sldMk cId="2346230621" sldId="260"/>
+        </pc:sldMkLst>
+        <pc:graphicFrameChg chg="modGraphic">
+          <ac:chgData name="Tegan Counts" userId="b2f4c86b45f7f6c0" providerId="LiveId" clId="{6F9851D4-582D-44BF-8000-722E5CF6B962}" dt="2022-09-13T03:08:55.755" v="27" actId="20577"/>
+          <ac:graphicFrameMkLst>
+            <pc:docMk/>
+            <pc:sldMk cId="2346230621" sldId="260"/>
+            <ac:graphicFrameMk id="4" creationId="{6E091AF2-00E4-4D5A-87FD-D153C81F4D1A}"/>
+          </ac:graphicFrameMkLst>
+        </pc:graphicFrameChg>
+      </pc:sldChg>
+      <pc:sldChg chg="modSp mod">
+        <pc:chgData name="Tegan Counts" userId="b2f4c86b45f7f6c0" providerId="LiveId" clId="{6F9851D4-582D-44BF-8000-722E5CF6B962}" dt="2022-09-13T03:08:43.969" v="14" actId="20577"/>
+        <pc:sldMkLst>
+          <pc:docMk/>
+          <pc:sldMk cId="1848200648" sldId="261"/>
+        </pc:sldMkLst>
+        <pc:graphicFrameChg chg="modGraphic">
+          <ac:chgData name="Tegan Counts" userId="b2f4c86b45f7f6c0" providerId="LiveId" clId="{6F9851D4-582D-44BF-8000-722E5CF6B962}" dt="2022-09-13T03:08:43.969" v="14" actId="20577"/>
+          <ac:graphicFrameMkLst>
+            <pc:docMk/>
+            <pc:sldMk cId="1848200648" sldId="261"/>
+            <ac:graphicFrameMk id="4" creationId="{6E091AF2-00E4-4D5A-87FD-D153C81F4D1A}"/>
+          </ac:graphicFrameMkLst>
+        </pc:graphicFrameChg>
+      </pc:sldChg>
+    </pc:docChg>
+  </pc:docChgLst>
 </pc:chgInfo>
 </file>
 
@@ -440,7 +486,7 @@
           <a:p>
             <a:fld id="{B96A9904-3C6C-4E30-BFE7-582D2B57479E}" type="datetimeFigureOut">
               <a:rPr lang="en-US" smtClean="0"/>
-              <a:t>8/13/2022</a:t>
+              <a:t>9/12/2022</a:t>
             </a:fld>
             <a:endParaRPr lang="en-US"/>
           </a:p>
@@ -638,7 +684,7 @@
           <a:p>
             <a:fld id="{B96A9904-3C6C-4E30-BFE7-582D2B57479E}" type="datetimeFigureOut">
               <a:rPr lang="en-US" smtClean="0"/>
-              <a:t>8/13/2022</a:t>
+              <a:t>9/12/2022</a:t>
             </a:fld>
             <a:endParaRPr lang="en-US"/>
           </a:p>
@@ -846,7 +892,7 @@
           <a:p>
             <a:fld id="{B96A9904-3C6C-4E30-BFE7-582D2B57479E}" type="datetimeFigureOut">
               <a:rPr lang="en-US" smtClean="0"/>
-              <a:t>8/13/2022</a:t>
+              <a:t>9/12/2022</a:t>
             </a:fld>
             <a:endParaRPr lang="en-US"/>
           </a:p>
@@ -1044,7 +1090,7 @@
           <a:p>
             <a:fld id="{B96A9904-3C6C-4E30-BFE7-582D2B57479E}" type="datetimeFigureOut">
               <a:rPr lang="en-US" smtClean="0"/>
-              <a:t>8/13/2022</a:t>
+              <a:t>9/12/2022</a:t>
             </a:fld>
             <a:endParaRPr lang="en-US"/>
           </a:p>
@@ -1319,7 +1365,7 @@
           <a:p>
             <a:fld id="{B96A9904-3C6C-4E30-BFE7-582D2B57479E}" type="datetimeFigureOut">
               <a:rPr lang="en-US" smtClean="0"/>
-              <a:t>8/13/2022</a:t>
+              <a:t>9/12/2022</a:t>
             </a:fld>
             <a:endParaRPr lang="en-US"/>
           </a:p>
@@ -1584,7 +1630,7 @@
           <a:p>
             <a:fld id="{B96A9904-3C6C-4E30-BFE7-582D2B57479E}" type="datetimeFigureOut">
               <a:rPr lang="en-US" smtClean="0"/>
-              <a:t>8/13/2022</a:t>
+              <a:t>9/12/2022</a:t>
             </a:fld>
             <a:endParaRPr lang="en-US"/>
           </a:p>
@@ -1996,7 +2042,7 @@
           <a:p>
             <a:fld id="{B96A9904-3C6C-4E30-BFE7-582D2B57479E}" type="datetimeFigureOut">
               <a:rPr lang="en-US" smtClean="0"/>
-              <a:t>8/13/2022</a:t>
+              <a:t>9/12/2022</a:t>
             </a:fld>
             <a:endParaRPr lang="en-US"/>
           </a:p>
@@ -2137,7 +2183,7 @@
           <a:p>
             <a:fld id="{B96A9904-3C6C-4E30-BFE7-582D2B57479E}" type="datetimeFigureOut">
               <a:rPr lang="en-US" smtClean="0"/>
-              <a:t>8/13/2022</a:t>
+              <a:t>9/12/2022</a:t>
             </a:fld>
             <a:endParaRPr lang="en-US"/>
           </a:p>
@@ -2250,7 +2296,7 @@
           <a:p>
             <a:fld id="{B96A9904-3C6C-4E30-BFE7-582D2B57479E}" type="datetimeFigureOut">
               <a:rPr lang="en-US" smtClean="0"/>
-              <a:t>8/13/2022</a:t>
+              <a:t>9/12/2022</a:t>
             </a:fld>
             <a:endParaRPr lang="en-US"/>
           </a:p>
@@ -2561,7 +2607,7 @@
           <a:p>
             <a:fld id="{B96A9904-3C6C-4E30-BFE7-582D2B57479E}" type="datetimeFigureOut">
               <a:rPr lang="en-US" smtClean="0"/>
-              <a:t>8/13/2022</a:t>
+              <a:t>9/12/2022</a:t>
             </a:fld>
             <a:endParaRPr lang="en-US"/>
           </a:p>
@@ -2849,7 +2895,7 @@
           <a:p>
             <a:fld id="{B96A9904-3C6C-4E30-BFE7-582D2B57479E}" type="datetimeFigureOut">
               <a:rPr lang="en-US" smtClean="0"/>
-              <a:t>8/13/2022</a:t>
+              <a:t>9/12/2022</a:t>
             </a:fld>
             <a:endParaRPr lang="en-US"/>
           </a:p>
@@ -3090,7 +3136,7 @@
           <a:p>
             <a:fld id="{B96A9904-3C6C-4E30-BFE7-582D2B57479E}" type="datetimeFigureOut">
               <a:rPr lang="en-US" smtClean="0"/>
-              <a:t>8/13/2022</a:t>
+              <a:t>9/12/2022</a:t>
             </a:fld>
             <a:endParaRPr lang="en-US"/>
           </a:p>
@@ -5865,7 +5911,7 @@
             <p:ph idx="4294967295"/>
             <p:extLst>
               <p:ext uri="{D42A27DB-BD31-4B8C-83A1-F6EECF244321}">
-                <p14:modId xmlns:p14="http://schemas.microsoft.com/office/powerpoint/2010/main" val="467763180"/>
+                <p14:modId xmlns:p14="http://schemas.microsoft.com/office/powerpoint/2010/main" val="2050421694"/>
               </p:ext>
             </p:extLst>
           </p:nvPr>
@@ -6287,8 +6333,13 @@
                     <a:p>
                       <a:r>
                         <a:rPr lang="en-US" sz="1400" dirty="0"/>
-                        <a:t>SELECT slot1_type, slot2_type, slot3_type, slot4_type, slot1_id, slot2_id, slot3_id, slot4_id</a:t>
-                      </a:r>
+                        <a:t>SELECT slot1_type, slot2_type, slot3_type, slot4_type, slot1_id, slot2_id, slot3_id, slot4_id, </a:t>
+                      </a:r>
+                      <a:r>
+                        <a:rPr lang="en-US" sz="1400" dirty="0" err="1"/>
+                        <a:t>num_hunters</a:t>
+                      </a:r>
+                      <a:endParaRPr lang="en-US" sz="1400" dirty="0"/>
                     </a:p>
                     <a:p>
                       <a:r>
@@ -6741,7 +6792,7 @@
             <p:ph idx="4294967295"/>
             <p:extLst>
               <p:ext uri="{D42A27DB-BD31-4B8C-83A1-F6EECF244321}">
-                <p14:modId xmlns:p14="http://schemas.microsoft.com/office/powerpoint/2010/main" val="1039082314"/>
+                <p14:modId xmlns:p14="http://schemas.microsoft.com/office/powerpoint/2010/main" val="1530696834"/>
               </p:ext>
             </p:extLst>
           </p:nvPr>
@@ -7359,8 +7410,13 @@
                     <a:p>
                       <a:r>
                         <a:rPr lang="en-US" sz="1400" dirty="0"/>
-                        <a:t>SELECT slot1_type, slot2_type, slot3_type, slot4_type, slot1_id, slot2_id, slot3_id, slot4_id</a:t>
-                      </a:r>
+                        <a:t>SELECT slot1_type, slot2_type, slot3_type, slot4_type, slot1_id, slot2_id, slot3_id, slot4_id, </a:t>
+                      </a:r>
+                      <a:r>
+                        <a:rPr lang="en-US" sz="1400" dirty="0" err="1"/>
+                        <a:t>num_hunters</a:t>
+                      </a:r>
+                      <a:endParaRPr lang="en-US" sz="1400" dirty="0"/>
                     </a:p>
                     <a:p>
                       <a:r>
@@ -7757,7 +7813,7 @@
             <p:ph idx="4294967295"/>
             <p:extLst>
               <p:ext uri="{D42A27DB-BD31-4B8C-83A1-F6EECF244321}">
-                <p14:modId xmlns:p14="http://schemas.microsoft.com/office/powerpoint/2010/main" val="4235573202"/>
+                <p14:modId xmlns:p14="http://schemas.microsoft.com/office/powerpoint/2010/main" val="1161929232"/>
               </p:ext>
             </p:extLst>
           </p:nvPr>
@@ -8366,8 +8422,13 @@
                     <a:p>
                       <a:r>
                         <a:rPr lang="en-US" sz="1400" dirty="0"/>
-                        <a:t>SELECT slot1_type, slot2_type, slot3_type, slot4_type, slot1_id, slot2_id, slot3_id, slot4_id</a:t>
-                      </a:r>
+                        <a:t>SELECT slot1_type, slot2_type, slot3_type, slot4_type, slot1_id, slot2_id, slot3_id, slot4_id, </a:t>
+                      </a:r>
+                      <a:r>
+                        <a:rPr lang="en-US" sz="1400" dirty="0" err="1"/>
+                        <a:t>num_hunters</a:t>
+                      </a:r>
+                      <a:endParaRPr lang="en-US" sz="1400" dirty="0"/>
                     </a:p>
                     <a:p>
                       <a:r>

</xml_diff>

<commit_message>
half way through with big duck mods
</commit_message>
<xml_diff>
--- a/docs/Redis.pptx
+++ b/docs/Redis.pptx
@@ -15,6 +15,7 @@
     <p:sldId id="263" r:id="rId9"/>
     <p:sldId id="262" r:id="rId10"/>
     <p:sldId id="265" r:id="rId11"/>
+    <p:sldId id="266" r:id="rId12"/>
   </p:sldIdLst>
   <p:sldSz cx="12192000" cy="6858000"/>
   <p:notesSz cx="6858000" cy="9144000"/>
@@ -119,6 +120,14 @@
     </p:ext>
   </p:extLst>
 </p:presentation>
+</file>
+
+<file path=ppt/revisionInfo.xml><?xml version="1.0" encoding="utf-8"?>
+<p1510:revInfo xmlns:a="http://schemas.openxmlformats.org/drawingml/2006/main" xmlns:r="http://schemas.openxmlformats.org/officeDocument/2006/relationships" xmlns:p1510="http://schemas.microsoft.com/office/powerpoint/2015/10/main">
+  <p1510:revLst>
+    <p1510:client id="{6F9851D4-582D-44BF-8000-722E5CF6B962}" v="2" dt="2022-10-09T20:26:10.469"/>
+  </p1510:revLst>
+</p1510:revInfo>
 </file>
 
 <file path=ppt/changesInfos/changesInfo1.xml><?xml version="1.0" encoding="utf-8"?>
@@ -284,19 +293,34 @@
   </pc:docChgLst>
   <pc:docChgLst>
     <pc:chgData name="Tegan Counts" userId="b2f4c86b45f7f6c0" providerId="LiveId" clId="{6F9851D4-582D-44BF-8000-722E5CF6B962}"/>
-    <pc:docChg chg="modSld">
-      <pc:chgData name="Tegan Counts" userId="b2f4c86b45f7f6c0" providerId="LiveId" clId="{6F9851D4-582D-44BF-8000-722E5CF6B962}" dt="2022-09-13T03:09:05.744" v="40" actId="20577"/>
+    <pc:docChg chg="custSel addSld modSld">
+      <pc:chgData name="Tegan Counts" userId="b2f4c86b45f7f6c0" providerId="LiveId" clId="{6F9851D4-582D-44BF-8000-722E5CF6B962}" dt="2022-10-09T20:26:27.782" v="258" actId="6549"/>
       <pc:docMkLst>
         <pc:docMk/>
       </pc:docMkLst>
       <pc:sldChg chg="modSp mod">
-        <pc:chgData name="Tegan Counts" userId="b2f4c86b45f7f6c0" providerId="LiveId" clId="{6F9851D4-582D-44BF-8000-722E5CF6B962}" dt="2022-09-13T03:09:05.744" v="40" actId="20577"/>
+        <pc:chgData name="Tegan Counts" userId="b2f4c86b45f7f6c0" providerId="LiveId" clId="{6F9851D4-582D-44BF-8000-722E5CF6B962}" dt="2022-10-08T20:15:28.782" v="251" actId="400"/>
+        <pc:sldMkLst>
+          <pc:docMk/>
+          <pc:sldMk cId="1050521169" sldId="257"/>
+        </pc:sldMkLst>
+        <pc:graphicFrameChg chg="modGraphic">
+          <ac:chgData name="Tegan Counts" userId="b2f4c86b45f7f6c0" providerId="LiveId" clId="{6F9851D4-582D-44BF-8000-722E5CF6B962}" dt="2022-10-08T20:15:28.782" v="251" actId="400"/>
+          <ac:graphicFrameMkLst>
+            <pc:docMk/>
+            <pc:sldMk cId="1050521169" sldId="257"/>
+            <ac:graphicFrameMk id="4" creationId="{6E091AF2-00E4-4D5A-87FD-D153C81F4D1A}"/>
+          </ac:graphicFrameMkLst>
+        </pc:graphicFrameChg>
+      </pc:sldChg>
+      <pc:sldChg chg="modSp mod">
+        <pc:chgData name="Tegan Counts" userId="b2f4c86b45f7f6c0" providerId="LiveId" clId="{6F9851D4-582D-44BF-8000-722E5CF6B962}" dt="2022-10-09T20:21:48.207" v="253" actId="400"/>
         <pc:sldMkLst>
           <pc:docMk/>
           <pc:sldMk cId="320344670" sldId="259"/>
         </pc:sldMkLst>
         <pc:graphicFrameChg chg="modGraphic">
-          <ac:chgData name="Tegan Counts" userId="b2f4c86b45f7f6c0" providerId="LiveId" clId="{6F9851D4-582D-44BF-8000-722E5CF6B962}" dt="2022-09-13T03:09:05.744" v="40" actId="20577"/>
+          <ac:chgData name="Tegan Counts" userId="b2f4c86b45f7f6c0" providerId="LiveId" clId="{6F9851D4-582D-44BF-8000-722E5CF6B962}" dt="2022-10-09T20:21:48.207" v="253" actId="400"/>
           <ac:graphicFrameMkLst>
             <pc:docMk/>
             <pc:sldMk cId="320344670" sldId="259"/>
@@ -305,13 +329,13 @@
         </pc:graphicFrameChg>
       </pc:sldChg>
       <pc:sldChg chg="modSp mod">
-        <pc:chgData name="Tegan Counts" userId="b2f4c86b45f7f6c0" providerId="LiveId" clId="{6F9851D4-582D-44BF-8000-722E5CF6B962}" dt="2022-09-13T03:08:55.755" v="27" actId="20577"/>
+        <pc:chgData name="Tegan Counts" userId="b2f4c86b45f7f6c0" providerId="LiveId" clId="{6F9851D4-582D-44BF-8000-722E5CF6B962}" dt="2022-10-09T20:17:03.251" v="252" actId="400"/>
         <pc:sldMkLst>
           <pc:docMk/>
           <pc:sldMk cId="2346230621" sldId="260"/>
         </pc:sldMkLst>
         <pc:graphicFrameChg chg="modGraphic">
-          <ac:chgData name="Tegan Counts" userId="b2f4c86b45f7f6c0" providerId="LiveId" clId="{6F9851D4-582D-44BF-8000-722E5CF6B962}" dt="2022-09-13T03:08:55.755" v="27" actId="20577"/>
+          <ac:chgData name="Tegan Counts" userId="b2f4c86b45f7f6c0" providerId="LiveId" clId="{6F9851D4-582D-44BF-8000-722E5CF6B962}" dt="2022-10-09T20:17:03.251" v="252" actId="400"/>
           <ac:graphicFrameMkLst>
             <pc:docMk/>
             <pc:sldMk cId="2346230621" sldId="260"/>
@@ -320,16 +344,61 @@
         </pc:graphicFrameChg>
       </pc:sldChg>
       <pc:sldChg chg="modSp mod">
-        <pc:chgData name="Tegan Counts" userId="b2f4c86b45f7f6c0" providerId="LiveId" clId="{6F9851D4-582D-44BF-8000-722E5CF6B962}" dt="2022-09-13T03:08:43.969" v="14" actId="20577"/>
+        <pc:chgData name="Tegan Counts" userId="b2f4c86b45f7f6c0" providerId="LiveId" clId="{6F9851D4-582D-44BF-8000-722E5CF6B962}" dt="2022-10-09T20:21:58.935" v="254" actId="400"/>
         <pc:sldMkLst>
           <pc:docMk/>
           <pc:sldMk cId="1848200648" sldId="261"/>
         </pc:sldMkLst>
         <pc:graphicFrameChg chg="modGraphic">
-          <ac:chgData name="Tegan Counts" userId="b2f4c86b45f7f6c0" providerId="LiveId" clId="{6F9851D4-582D-44BF-8000-722E5CF6B962}" dt="2022-09-13T03:08:43.969" v="14" actId="20577"/>
+          <ac:chgData name="Tegan Counts" userId="b2f4c86b45f7f6c0" providerId="LiveId" clId="{6F9851D4-582D-44BF-8000-722E5CF6B962}" dt="2022-10-09T20:21:58.935" v="254" actId="400"/>
           <ac:graphicFrameMkLst>
             <pc:docMk/>
             <pc:sldMk cId="1848200648" sldId="261"/>
+            <ac:graphicFrameMk id="4" creationId="{6E091AF2-00E4-4D5A-87FD-D153C81F4D1A}"/>
+          </ac:graphicFrameMkLst>
+        </pc:graphicFrameChg>
+      </pc:sldChg>
+      <pc:sldChg chg="modSp mod">
+        <pc:chgData name="Tegan Counts" userId="b2f4c86b45f7f6c0" providerId="LiveId" clId="{6F9851D4-582D-44BF-8000-722E5CF6B962}" dt="2022-10-09T20:26:27.782" v="258" actId="6549"/>
+        <pc:sldMkLst>
+          <pc:docMk/>
+          <pc:sldMk cId="1364438841" sldId="264"/>
+        </pc:sldMkLst>
+        <pc:graphicFrameChg chg="mod modGraphic">
+          <ac:chgData name="Tegan Counts" userId="b2f4c86b45f7f6c0" providerId="LiveId" clId="{6F9851D4-582D-44BF-8000-722E5CF6B962}" dt="2022-10-09T20:26:27.782" v="258" actId="6549"/>
+          <ac:graphicFrameMkLst>
+            <pc:docMk/>
+            <pc:sldMk cId="1364438841" sldId="264"/>
+            <ac:graphicFrameMk id="4" creationId="{6E091AF2-00E4-4D5A-87FD-D153C81F4D1A}"/>
+          </ac:graphicFrameMkLst>
+        </pc:graphicFrameChg>
+      </pc:sldChg>
+      <pc:sldChg chg="modSp mod">
+        <pc:chgData name="Tegan Counts" userId="b2f4c86b45f7f6c0" providerId="LiveId" clId="{6F9851D4-582D-44BF-8000-722E5CF6B962}" dt="2022-10-08T17:19:49.861" v="41" actId="20577"/>
+        <pc:sldMkLst>
+          <pc:docMk/>
+          <pc:sldMk cId="20777508" sldId="265"/>
+        </pc:sldMkLst>
+        <pc:graphicFrameChg chg="modGraphic">
+          <ac:chgData name="Tegan Counts" userId="b2f4c86b45f7f6c0" providerId="LiveId" clId="{6F9851D4-582D-44BF-8000-722E5CF6B962}" dt="2022-10-08T17:19:49.861" v="41" actId="20577"/>
+          <ac:graphicFrameMkLst>
+            <pc:docMk/>
+            <pc:sldMk cId="20777508" sldId="265"/>
+            <ac:graphicFrameMk id="4" creationId="{6E091AF2-00E4-4D5A-87FD-D153C81F4D1A}"/>
+          </ac:graphicFrameMkLst>
+        </pc:graphicFrameChg>
+      </pc:sldChg>
+      <pc:sldChg chg="modSp add mod">
+        <pc:chgData name="Tegan Counts" userId="b2f4c86b45f7f6c0" providerId="LiveId" clId="{6F9851D4-582D-44BF-8000-722E5CF6B962}" dt="2022-10-08T17:26:48.657" v="189" actId="20577"/>
+        <pc:sldMkLst>
+          <pc:docMk/>
+          <pc:sldMk cId="569708411" sldId="266"/>
+        </pc:sldMkLst>
+        <pc:graphicFrameChg chg="mod modGraphic">
+          <ac:chgData name="Tegan Counts" userId="b2f4c86b45f7f6c0" providerId="LiveId" clId="{6F9851D4-582D-44BF-8000-722E5CF6B962}" dt="2022-10-08T17:26:48.657" v="189" actId="20577"/>
+          <ac:graphicFrameMkLst>
+            <pc:docMk/>
+            <pc:sldMk cId="569708411" sldId="266"/>
             <ac:graphicFrameMk id="4" creationId="{6E091AF2-00E4-4D5A-87FD-D153C81F4D1A}"/>
           </ac:graphicFrameMkLst>
         </pc:graphicFrameChg>
@@ -486,7 +555,7 @@
           <a:p>
             <a:fld id="{B96A9904-3C6C-4E30-BFE7-582D2B57479E}" type="datetimeFigureOut">
               <a:rPr lang="en-US" smtClean="0"/>
-              <a:t>9/12/2022</a:t>
+              <a:t>10/8/2022</a:t>
             </a:fld>
             <a:endParaRPr lang="en-US"/>
           </a:p>
@@ -684,7 +753,7 @@
           <a:p>
             <a:fld id="{B96A9904-3C6C-4E30-BFE7-582D2B57479E}" type="datetimeFigureOut">
               <a:rPr lang="en-US" smtClean="0"/>
-              <a:t>9/12/2022</a:t>
+              <a:t>10/8/2022</a:t>
             </a:fld>
             <a:endParaRPr lang="en-US"/>
           </a:p>
@@ -892,7 +961,7 @@
           <a:p>
             <a:fld id="{B96A9904-3C6C-4E30-BFE7-582D2B57479E}" type="datetimeFigureOut">
               <a:rPr lang="en-US" smtClean="0"/>
-              <a:t>9/12/2022</a:t>
+              <a:t>10/8/2022</a:t>
             </a:fld>
             <a:endParaRPr lang="en-US"/>
           </a:p>
@@ -1090,7 +1159,7 @@
           <a:p>
             <a:fld id="{B96A9904-3C6C-4E30-BFE7-582D2B57479E}" type="datetimeFigureOut">
               <a:rPr lang="en-US" smtClean="0"/>
-              <a:t>9/12/2022</a:t>
+              <a:t>10/8/2022</a:t>
             </a:fld>
             <a:endParaRPr lang="en-US"/>
           </a:p>
@@ -1365,7 +1434,7 @@
           <a:p>
             <a:fld id="{B96A9904-3C6C-4E30-BFE7-582D2B57479E}" type="datetimeFigureOut">
               <a:rPr lang="en-US" smtClean="0"/>
-              <a:t>9/12/2022</a:t>
+              <a:t>10/8/2022</a:t>
             </a:fld>
             <a:endParaRPr lang="en-US"/>
           </a:p>
@@ -1630,7 +1699,7 @@
           <a:p>
             <a:fld id="{B96A9904-3C6C-4E30-BFE7-582D2B57479E}" type="datetimeFigureOut">
               <a:rPr lang="en-US" smtClean="0"/>
-              <a:t>9/12/2022</a:t>
+              <a:t>10/8/2022</a:t>
             </a:fld>
             <a:endParaRPr lang="en-US"/>
           </a:p>
@@ -2042,7 +2111,7 @@
           <a:p>
             <a:fld id="{B96A9904-3C6C-4E30-BFE7-582D2B57479E}" type="datetimeFigureOut">
               <a:rPr lang="en-US" smtClean="0"/>
-              <a:t>9/12/2022</a:t>
+              <a:t>10/8/2022</a:t>
             </a:fld>
             <a:endParaRPr lang="en-US"/>
           </a:p>
@@ -2183,7 +2252,7 @@
           <a:p>
             <a:fld id="{B96A9904-3C6C-4E30-BFE7-582D2B57479E}" type="datetimeFigureOut">
               <a:rPr lang="en-US" smtClean="0"/>
-              <a:t>9/12/2022</a:t>
+              <a:t>10/8/2022</a:t>
             </a:fld>
             <a:endParaRPr lang="en-US"/>
           </a:p>
@@ -2296,7 +2365,7 @@
           <a:p>
             <a:fld id="{B96A9904-3C6C-4E30-BFE7-582D2B57479E}" type="datetimeFigureOut">
               <a:rPr lang="en-US" smtClean="0"/>
-              <a:t>9/12/2022</a:t>
+              <a:t>10/8/2022</a:t>
             </a:fld>
             <a:endParaRPr lang="en-US"/>
           </a:p>
@@ -2607,7 +2676,7 @@
           <a:p>
             <a:fld id="{B96A9904-3C6C-4E30-BFE7-582D2B57479E}" type="datetimeFigureOut">
               <a:rPr lang="en-US" smtClean="0"/>
-              <a:t>9/12/2022</a:t>
+              <a:t>10/8/2022</a:t>
             </a:fld>
             <a:endParaRPr lang="en-US"/>
           </a:p>
@@ -2895,7 +2964,7 @@
           <a:p>
             <a:fld id="{B96A9904-3C6C-4E30-BFE7-582D2B57479E}" type="datetimeFigureOut">
               <a:rPr lang="en-US" smtClean="0"/>
-              <a:t>9/12/2022</a:t>
+              <a:t>10/8/2022</a:t>
             </a:fld>
             <a:endParaRPr lang="en-US"/>
           </a:p>
@@ -3136,7 +3205,7 @@
           <a:p>
             <a:fld id="{B96A9904-3C6C-4E30-BFE7-582D2B57479E}" type="datetimeFigureOut">
               <a:rPr lang="en-US" smtClean="0"/>
-              <a:t>9/12/2022</a:t>
+              <a:t>10/8/2022</a:t>
             </a:fld>
             <a:endParaRPr lang="en-US"/>
           </a:p>
@@ -3649,7 +3718,7 @@
             <p:ph idx="4294967295"/>
             <p:extLst>
               <p:ext uri="{D42A27DB-BD31-4B8C-83A1-F6EECF244321}">
-                <p14:modId xmlns:p14="http://schemas.microsoft.com/office/powerpoint/2010/main" val="4254707994"/>
+                <p14:modId xmlns:p14="http://schemas.microsoft.com/office/powerpoint/2010/main" val="1787442482"/>
               </p:ext>
             </p:extLst>
           </p:nvPr>
@@ -3722,7 +3791,7 @@
                     <a:p>
                       <a:r>
                         <a:rPr lang="en-US" sz="1600" dirty="0"/>
-                        <a:t>huntss.py</a:t>
+                        <a:t>hunts.py</a:t>
                       </a:r>
                     </a:p>
                   </a:txBody>
@@ -4165,7 +4234,7 @@
 </p:sld>
 </file>
 
-<file path=ppt/slides/slide2.xml><?xml version="1.0" encoding="utf-8"?>
+<file path=ppt/slides/slide11.xml><?xml version="1.0" encoding="utf-8"?>
 <p:sld xmlns:a="http://schemas.openxmlformats.org/drawingml/2006/main" xmlns:r="http://schemas.openxmlformats.org/officeDocument/2006/relationships" xmlns:p="http://schemas.openxmlformats.org/presentationml/2006/main">
   <p:cSld>
     <p:spTree>
@@ -4198,14 +4267,14 @@
             <p:ph idx="4294967295"/>
             <p:extLst>
               <p:ext uri="{D42A27DB-BD31-4B8C-83A1-F6EECF244321}">
-                <p14:modId xmlns:p14="http://schemas.microsoft.com/office/powerpoint/2010/main" val="3025539099"/>
+                <p14:modId xmlns:p14="http://schemas.microsoft.com/office/powerpoint/2010/main" val="4036354435"/>
               </p:ext>
             </p:extLst>
           </p:nvPr>
         </p:nvGraphicFramePr>
         <p:xfrm>
           <a:off x="339281" y="241300"/>
-          <a:ext cx="11330559" cy="6019800"/>
+          <a:ext cx="11330559" cy="2580640"/>
         </p:xfrm>
         <a:graphic>
           <a:graphicData uri="http://schemas.openxmlformats.org/drawingml/2006/table">
@@ -4270,8 +4339,12 @@
                     <a:lstStyle/>
                     <a:p>
                       <a:r>
+                        <a:rPr lang="en-US" sz="1600"/>
+                        <a:t>hunts.</a:t>
+                      </a:r>
+                      <a:r>
                         <a:rPr lang="en-US" sz="1600" dirty="0"/>
-                        <a:t>groupings.py</a:t>
+                        <a:t>py</a:t>
                       </a:r>
                     </a:p>
                   </a:txBody>
@@ -4334,7 +4407,7 @@
                     <a:p>
                       <a:r>
                         <a:rPr lang="en-US" sz="1600" dirty="0" err="1"/>
-                        <a:t>get_groups_in_current_hunt</a:t>
+                        <a:t>get_open_hunt</a:t>
                       </a:r>
                       <a:endParaRPr lang="en-US" sz="1600" dirty="0"/>
                     </a:p>
@@ -4398,7 +4471,7 @@
                     <a:p>
                       <a:r>
                         <a:rPr lang="en-US" sz="1600" dirty="0"/>
-                        <a:t>/groupings/current</a:t>
+                        <a:t>many</a:t>
                       </a:r>
                     </a:p>
                   </a:txBody>
@@ -4466,17 +4539,9 @@
                     <a:lstStyle/>
                     <a:p>
                       <a:r>
-                        <a:rPr lang="en-US" sz="1600" dirty="0" err="1"/>
-                        <a:t>u_pre</a:t>
-                      </a:r>
-                      <a:endParaRPr lang="en-US" sz="1600" dirty="0"/>
-                    </a:p>
-                    <a:p>
-                      <a:r>
-                        <a:rPr lang="en-US" sz="1600" dirty="0" err="1"/>
-                        <a:t>m_groupings</a:t>
-                      </a:r>
-                      <a:endParaRPr lang="en-US" sz="1600" dirty="0"/>
+                        <a:rPr lang="en-US" sz="1600" dirty="0"/>
+                        <a:t>many</a:t>
+                      </a:r>
                     </a:p>
                   </a:txBody>
                   <a:tcPr/>
@@ -4555,9 +4620,553 @@
                       </a:pPr>
                       <a:r>
                         <a:rPr lang="en-US" sz="1600" dirty="0"/>
-                        <a:t>caller’s group id</a:t>
-                      </a:r>
-                    </a:p>
+                        <a:t>current open hunt</a:t>
+                      </a:r>
+                    </a:p>
+                  </a:txBody>
+                  <a:tcPr/>
+                </a:tc>
+                <a:tc>
+                  <a:txBody>
+                    <a:bodyPr/>
+                    <a:lstStyle/>
+                    <a:p>
+                      <a:pPr algn="ctr"/>
+                      <a:r>
+                        <a:rPr lang="en-US" sz="1600" b="1" dirty="0"/>
+                        <a:t>Redis key</a:t>
+                      </a:r>
+                    </a:p>
+                  </a:txBody>
+                  <a:tcPr anchor="b"/>
+                </a:tc>
+                <a:tc>
+                  <a:txBody>
+                    <a:bodyPr/>
+                    <a:lstStyle/>
+                    <a:p>
+                      <a:pPr algn="ctr"/>
+                      <a:r>
+                        <a:rPr lang="en-US" sz="1600" b="1" dirty="0"/>
+                        <a:t>Expiration</a:t>
+                      </a:r>
+                    </a:p>
+                  </a:txBody>
+                  <a:tcPr anchor="b"/>
+                </a:tc>
+                <a:tc>
+                  <a:txBody>
+                    <a:bodyPr/>
+                    <a:lstStyle/>
+                    <a:p>
+                      <a:pPr algn="ctr"/>
+                      <a:r>
+                        <a:rPr lang="en-US" sz="1600" b="1" dirty="0"/>
+                        <a:t>Delete</a:t>
+                      </a:r>
+                    </a:p>
+                  </a:txBody>
+                  <a:tcPr anchor="b"/>
+                </a:tc>
+                <a:extLst>
+                  <a:ext uri="{0D108BD9-81ED-4DB2-BD59-A6C34878D82A}">
+                    <a16:rowId xmlns:a16="http://schemas.microsoft.com/office/drawing/2014/main" val="1516606734"/>
+                  </a:ext>
+                </a:extLst>
+              </a:tr>
+              <a:tr h="0">
+                <a:tc>
+                  <a:txBody>
+                    <a:bodyPr/>
+                    <a:lstStyle/>
+                    <a:p>
+                      <a:r>
+                        <a:rPr lang="en-US" sz="1600" dirty="0"/>
+                        <a:t>DB calls</a:t>
+                      </a:r>
+                    </a:p>
+                  </a:txBody>
+                  <a:tcPr/>
+                </a:tc>
+                <a:tc>
+                  <a:txBody>
+                    <a:bodyPr/>
+                    <a:lstStyle/>
+                    <a:p>
+                      <a:r>
+                        <a:rPr lang="en-US" sz="1400" dirty="0"/>
+                        <a:t>SELECT id, status FROM hunts WHERE status IN ('</a:t>
+                      </a:r>
+                      <a:r>
+                        <a:rPr lang="en-US" sz="1400" dirty="0" err="1"/>
+                        <a:t>signup_open</a:t>
+                      </a:r>
+                      <a:r>
+                        <a:rPr lang="en-US" sz="1400" dirty="0"/>
+                        <a:t>', '</a:t>
+                      </a:r>
+                      <a:r>
+                        <a:rPr lang="en-US" sz="1400" dirty="0" err="1"/>
+                        <a:t>signup_closed</a:t>
+                      </a:r>
+                      <a:r>
+                        <a:rPr lang="en-US" sz="1400" dirty="0"/>
+                        <a:t>', '</a:t>
+                      </a:r>
+                      <a:r>
+                        <a:rPr lang="en-US" sz="1400" dirty="0" err="1"/>
+                        <a:t>draw_complete</a:t>
+                      </a:r>
+                      <a:r>
+                        <a:rPr lang="en-US" sz="1400" dirty="0"/>
+                        <a:t>', '</a:t>
+                      </a:r>
+                      <a:r>
+                        <a:rPr lang="en-US" sz="1400" dirty="0" err="1"/>
+                        <a:t>hunt_open</a:t>
+                      </a:r>
+                      <a:r>
+                        <a:rPr lang="en-US" sz="1400" dirty="0"/>
+                        <a:t>')</a:t>
+                      </a:r>
+                    </a:p>
+                  </a:txBody>
+                  <a:tcPr/>
+                </a:tc>
+                <a:tc>
+                  <a:txBody>
+                    <a:bodyPr/>
+                    <a:lstStyle/>
+                    <a:p>
+                      <a:pPr algn="ctr"/>
+                      <a:r>
+                        <a:rPr lang="en-US" sz="1400" dirty="0"/>
+                        <a:t>tango</a:t>
+                      </a:r>
+                    </a:p>
+                  </a:txBody>
+                  <a:tcPr marL="45720" marR="45720"/>
+                </a:tc>
+                <a:tc>
+                  <a:txBody>
+                    <a:bodyPr/>
+                    <a:lstStyle/>
+                    <a:p>
+                      <a:pPr algn="ctr"/>
+                      <a:r>
+                        <a:rPr lang="en-US" sz="1400" dirty="0"/>
+                        <a:t>1 hour</a:t>
+                      </a:r>
+                    </a:p>
+                  </a:txBody>
+                  <a:tcPr marL="45720" marR="45720"/>
+                </a:tc>
+                <a:tc>
+                  <a:txBody>
+                    <a:bodyPr/>
+                    <a:lstStyle/>
+                    <a:p>
+                      <a:r>
+                        <a:rPr lang="en-US" sz="1400" dirty="0"/>
+                        <a:t>hunts CUD</a:t>
+                      </a:r>
+                    </a:p>
+                  </a:txBody>
+                  <a:tcPr marL="45720" marR="45720"/>
+                </a:tc>
+                <a:extLst>
+                  <a:ext uri="{0D108BD9-81ED-4DB2-BD59-A6C34878D82A}">
+                    <a16:rowId xmlns:a16="http://schemas.microsoft.com/office/drawing/2014/main" val="2130996453"/>
+                  </a:ext>
+                </a:extLst>
+              </a:tr>
+            </a:tbl>
+          </a:graphicData>
+        </a:graphic>
+      </p:graphicFrame>
+    </p:spTree>
+    <p:extLst>
+      <p:ext uri="{BB962C8B-B14F-4D97-AF65-F5344CB8AC3E}">
+        <p14:creationId xmlns:p14="http://schemas.microsoft.com/office/powerpoint/2010/main" val="569708411"/>
+      </p:ext>
+    </p:extLst>
+  </p:cSld>
+  <p:clrMapOvr>
+    <a:masterClrMapping/>
+  </p:clrMapOvr>
+</p:sld>
+</file>
+
+<file path=ppt/slides/slide2.xml><?xml version="1.0" encoding="utf-8"?>
+<p:sld xmlns:a="http://schemas.openxmlformats.org/drawingml/2006/main" xmlns:r="http://schemas.openxmlformats.org/officeDocument/2006/relationships" xmlns:p="http://schemas.openxmlformats.org/presentationml/2006/main">
+  <p:cSld>
+    <p:spTree>
+      <p:nvGrpSpPr>
+        <p:cNvPr id="1" name=""/>
+        <p:cNvGrpSpPr/>
+        <p:nvPr/>
+      </p:nvGrpSpPr>
+      <p:grpSpPr>
+        <a:xfrm>
+          <a:off x="0" y="0"/>
+          <a:ext cx="0" cy="0"/>
+          <a:chOff x="0" y="0"/>
+          <a:chExt cx="0" cy="0"/>
+        </a:xfrm>
+      </p:grpSpPr>
+      <p:graphicFrame>
+        <p:nvGraphicFramePr>
+          <p:cNvPr id="4" name="Table 4">
+            <a:extLst>
+              <a:ext uri="{FF2B5EF4-FFF2-40B4-BE49-F238E27FC236}">
+                <a16:creationId xmlns:a16="http://schemas.microsoft.com/office/drawing/2014/main" id="{6E091AF2-00E4-4D5A-87FD-D153C81F4D1A}"/>
+              </a:ext>
+            </a:extLst>
+          </p:cNvPr>
+          <p:cNvGraphicFramePr>
+            <a:graphicFrameLocks noGrp="1"/>
+          </p:cNvGraphicFramePr>
+          <p:nvPr>
+            <p:ph idx="4294967295"/>
+            <p:extLst>
+              <p:ext uri="{D42A27DB-BD31-4B8C-83A1-F6EECF244321}">
+                <p14:modId xmlns:p14="http://schemas.microsoft.com/office/powerpoint/2010/main" val="1177931242"/>
+              </p:ext>
+            </p:extLst>
+          </p:nvPr>
+        </p:nvGraphicFramePr>
+        <p:xfrm>
+          <a:off x="339281" y="241300"/>
+          <a:ext cx="11330559" cy="5872480"/>
+        </p:xfrm>
+        <a:graphic>
+          <a:graphicData uri="http://schemas.openxmlformats.org/drawingml/2006/table">
+            <a:tbl>
+              <a:tblPr firstRow="1" bandRow="1">
+                <a:tableStyleId>{5940675A-B579-460E-94D1-54222C63F5DA}</a:tableStyleId>
+              </a:tblPr>
+              <a:tblGrid>
+                <a:gridCol w="997839">
+                  <a:extLst>
+                    <a:ext uri="{9D8B030D-6E8A-4147-A177-3AD203B41FA5}">
+                      <a16:colId xmlns:a16="http://schemas.microsoft.com/office/drawing/2014/main" val="650972074"/>
+                    </a:ext>
+                  </a:extLst>
+                </a:gridCol>
+                <a:gridCol w="6400800">
+                  <a:extLst>
+                    <a:ext uri="{9D8B030D-6E8A-4147-A177-3AD203B41FA5}">
+                      <a16:colId xmlns:a16="http://schemas.microsoft.com/office/drawing/2014/main" val="3347763763"/>
+                    </a:ext>
+                  </a:extLst>
+                </a:gridCol>
+                <a:gridCol w="1188720">
+                  <a:extLst>
+                    <a:ext uri="{9D8B030D-6E8A-4147-A177-3AD203B41FA5}">
+                      <a16:colId xmlns:a16="http://schemas.microsoft.com/office/drawing/2014/main" val="2334996347"/>
+                    </a:ext>
+                  </a:extLst>
+                </a:gridCol>
+                <a:gridCol w="1097280">
+                  <a:extLst>
+                    <a:ext uri="{9D8B030D-6E8A-4147-A177-3AD203B41FA5}">
+                      <a16:colId xmlns:a16="http://schemas.microsoft.com/office/drawing/2014/main" val="510532850"/>
+                    </a:ext>
+                  </a:extLst>
+                </a:gridCol>
+                <a:gridCol w="1645920">
+                  <a:extLst>
+                    <a:ext uri="{9D8B030D-6E8A-4147-A177-3AD203B41FA5}">
+                      <a16:colId xmlns:a16="http://schemas.microsoft.com/office/drawing/2014/main" val="1544489523"/>
+                    </a:ext>
+                  </a:extLst>
+                </a:gridCol>
+              </a:tblGrid>
+              <a:tr h="370840">
+                <a:tc>
+                  <a:txBody>
+                    <a:bodyPr/>
+                    <a:lstStyle/>
+                    <a:p>
+                      <a:r>
+                        <a:rPr lang="en-US" sz="1600" dirty="0"/>
+                        <a:t>API</a:t>
+                      </a:r>
+                    </a:p>
+                  </a:txBody>
+                  <a:tcPr/>
+                </a:tc>
+                <a:tc>
+                  <a:txBody>
+                    <a:bodyPr/>
+                    <a:lstStyle/>
+                    <a:p>
+                      <a:r>
+                        <a:rPr lang="en-US" sz="1600" dirty="0"/>
+                        <a:t>groupings.py</a:t>
+                      </a:r>
+                    </a:p>
+                  </a:txBody>
+                  <a:tcPr/>
+                </a:tc>
+                <a:tc>
+                  <a:txBody>
+                    <a:bodyPr/>
+                    <a:lstStyle/>
+                    <a:p>
+                      <a:endParaRPr lang="en-US" sz="1600" dirty="0"/>
+                    </a:p>
+                  </a:txBody>
+                  <a:tcPr/>
+                </a:tc>
+                <a:tc>
+                  <a:txBody>
+                    <a:bodyPr/>
+                    <a:lstStyle/>
+                    <a:p>
+                      <a:endParaRPr lang="en-US" sz="1600" dirty="0"/>
+                    </a:p>
+                  </a:txBody>
+                  <a:tcPr/>
+                </a:tc>
+                <a:tc>
+                  <a:txBody>
+                    <a:bodyPr/>
+                    <a:lstStyle/>
+                    <a:p>
+                      <a:endParaRPr lang="en-US" sz="1600" dirty="0"/>
+                    </a:p>
+                  </a:txBody>
+                  <a:tcPr/>
+                </a:tc>
+                <a:extLst>
+                  <a:ext uri="{0D108BD9-81ED-4DB2-BD59-A6C34878D82A}">
+                    <a16:rowId xmlns:a16="http://schemas.microsoft.com/office/drawing/2014/main" val="1412316110"/>
+                  </a:ext>
+                </a:extLst>
+              </a:tr>
+              <a:tr h="370840">
+                <a:tc>
+                  <a:txBody>
+                    <a:bodyPr/>
+                    <a:lstStyle/>
+                    <a:p>
+                      <a:r>
+                        <a:rPr lang="en-US" sz="1600" dirty="0"/>
+                        <a:t>method</a:t>
+                      </a:r>
+                    </a:p>
+                  </a:txBody>
+                  <a:tcPr/>
+                </a:tc>
+                <a:tc>
+                  <a:txBody>
+                    <a:bodyPr/>
+                    <a:lstStyle/>
+                    <a:p>
+                      <a:r>
+                        <a:rPr lang="en-US" sz="1600" dirty="0" err="1"/>
+                        <a:t>get_groups_in_current_hunt</a:t>
+                      </a:r>
+                      <a:endParaRPr lang="en-US" sz="1600" dirty="0"/>
+                    </a:p>
+                  </a:txBody>
+                  <a:tcPr/>
+                </a:tc>
+                <a:tc>
+                  <a:txBody>
+                    <a:bodyPr/>
+                    <a:lstStyle/>
+                    <a:p>
+                      <a:endParaRPr lang="en-US" sz="1600" dirty="0"/>
+                    </a:p>
+                  </a:txBody>
+                  <a:tcPr/>
+                </a:tc>
+                <a:tc>
+                  <a:txBody>
+                    <a:bodyPr/>
+                    <a:lstStyle/>
+                    <a:p>
+                      <a:endParaRPr lang="en-US" sz="1600" dirty="0"/>
+                    </a:p>
+                  </a:txBody>
+                  <a:tcPr/>
+                </a:tc>
+                <a:tc>
+                  <a:txBody>
+                    <a:bodyPr/>
+                    <a:lstStyle/>
+                    <a:p>
+                      <a:endParaRPr lang="en-US" sz="1600" dirty="0"/>
+                    </a:p>
+                  </a:txBody>
+                  <a:tcPr/>
+                </a:tc>
+                <a:extLst>
+                  <a:ext uri="{0D108BD9-81ED-4DB2-BD59-A6C34878D82A}">
+                    <a16:rowId xmlns:a16="http://schemas.microsoft.com/office/drawing/2014/main" val="82044336"/>
+                  </a:ext>
+                </a:extLst>
+              </a:tr>
+              <a:tr h="370840">
+                <a:tc>
+                  <a:txBody>
+                    <a:bodyPr/>
+                    <a:lstStyle/>
+                    <a:p>
+                      <a:r>
+                        <a:rPr lang="en-US" sz="1600" dirty="0"/>
+                        <a:t>route</a:t>
+                      </a:r>
+                    </a:p>
+                  </a:txBody>
+                  <a:tcPr/>
+                </a:tc>
+                <a:tc>
+                  <a:txBody>
+                    <a:bodyPr/>
+                    <a:lstStyle/>
+                    <a:p>
+                      <a:r>
+                        <a:rPr lang="en-US" sz="1600" dirty="0"/>
+                        <a:t>/groupings/current</a:t>
+                      </a:r>
+                    </a:p>
+                  </a:txBody>
+                  <a:tcPr/>
+                </a:tc>
+                <a:tc>
+                  <a:txBody>
+                    <a:bodyPr/>
+                    <a:lstStyle/>
+                    <a:p>
+                      <a:endParaRPr lang="en-US" sz="1600" dirty="0"/>
+                    </a:p>
+                  </a:txBody>
+                  <a:tcPr/>
+                </a:tc>
+                <a:tc>
+                  <a:txBody>
+                    <a:bodyPr/>
+                    <a:lstStyle/>
+                    <a:p>
+                      <a:endParaRPr lang="en-US" sz="1600" dirty="0"/>
+                    </a:p>
+                  </a:txBody>
+                  <a:tcPr/>
+                </a:tc>
+                <a:tc>
+                  <a:txBody>
+                    <a:bodyPr/>
+                    <a:lstStyle/>
+                    <a:p>
+                      <a:endParaRPr lang="en-US" sz="1600" dirty="0"/>
+                    </a:p>
+                  </a:txBody>
+                  <a:tcPr/>
+                </a:tc>
+                <a:extLst>
+                  <a:ext uri="{0D108BD9-81ED-4DB2-BD59-A6C34878D82A}">
+                    <a16:rowId xmlns:a16="http://schemas.microsoft.com/office/drawing/2014/main" val="4262540346"/>
+                  </a:ext>
+                </a:extLst>
+              </a:tr>
+              <a:tr h="370840">
+                <a:tc>
+                  <a:txBody>
+                    <a:bodyPr/>
+                    <a:lstStyle/>
+                    <a:p>
+                      <a:r>
+                        <a:rPr lang="en-US" sz="1600" dirty="0"/>
+                        <a:t>frontend </a:t>
+                      </a:r>
+                    </a:p>
+                    <a:p>
+                      <a:r>
+                        <a:rPr lang="en-US" sz="1600" dirty="0"/>
+                        <a:t>usage</a:t>
+                      </a:r>
+                    </a:p>
+                  </a:txBody>
+                  <a:tcPr/>
+                </a:tc>
+                <a:tc>
+                  <a:txBody>
+                    <a:bodyPr/>
+                    <a:lstStyle/>
+                    <a:p>
+                      <a:r>
+                        <a:rPr lang="en-US" sz="1600" dirty="0" err="1"/>
+                        <a:t>u_pre</a:t>
+                      </a:r>
+                      <a:endParaRPr lang="en-US" sz="1600" dirty="0"/>
+                    </a:p>
+                    <a:p>
+                      <a:r>
+                        <a:rPr lang="en-US" sz="1600" dirty="0" err="1"/>
+                        <a:t>m_groupings</a:t>
+                      </a:r>
+                      <a:endParaRPr lang="en-US" sz="1600" dirty="0"/>
+                    </a:p>
+                  </a:txBody>
+                  <a:tcPr/>
+                </a:tc>
+                <a:tc>
+                  <a:txBody>
+                    <a:bodyPr/>
+                    <a:lstStyle/>
+                    <a:p>
+                      <a:endParaRPr lang="en-US" sz="1600" dirty="0"/>
+                    </a:p>
+                  </a:txBody>
+                  <a:tcPr/>
+                </a:tc>
+                <a:tc>
+                  <a:txBody>
+                    <a:bodyPr/>
+                    <a:lstStyle/>
+                    <a:p>
+                      <a:endParaRPr lang="en-US" sz="1600" dirty="0"/>
+                    </a:p>
+                  </a:txBody>
+                  <a:tcPr/>
+                </a:tc>
+                <a:tc>
+                  <a:txBody>
+                    <a:bodyPr/>
+                    <a:lstStyle/>
+                    <a:p>
+                      <a:endParaRPr lang="en-US" sz="1600" dirty="0"/>
+                    </a:p>
+                  </a:txBody>
+                  <a:tcPr/>
+                </a:tc>
+                <a:extLst>
+                  <a:ext uri="{0D108BD9-81ED-4DB2-BD59-A6C34878D82A}">
+                    <a16:rowId xmlns:a16="http://schemas.microsoft.com/office/drawing/2014/main" val="716380712"/>
+                  </a:ext>
+                </a:extLst>
+              </a:tr>
+              <a:tr h="370840">
+                <a:tc>
+                  <a:txBody>
+                    <a:bodyPr/>
+                    <a:lstStyle/>
+                    <a:p>
+                      <a:r>
+                        <a:rPr lang="en-US" sz="1600" dirty="0"/>
+                        <a:t>results</a:t>
+                      </a:r>
+                    </a:p>
+                  </a:txBody>
+                  <a:tcPr/>
+                </a:tc>
+                <a:tc>
+                  <a:txBody>
+                    <a:bodyPr/>
+                    <a:lstStyle/>
                     <a:p>
                       <a:pPr marL="0" marR="0" lvl="0" indent="0" algn="l" defTabSz="914400" rtl="0" eaLnBrk="1" fontAlgn="auto" latinLnBrk="0" hangingPunct="1">
                         <a:lnSpc>
@@ -4578,7 +5187,7 @@
                       </a:pPr>
                       <a:r>
                         <a:rPr lang="en-US" sz="1600" dirty="0"/>
-                        <a:t>hunt in “pre-hunt” status</a:t>
+                        <a:t>caller’s group id</a:t>
                       </a:r>
                     </a:p>
                     <a:p>
@@ -4601,7 +5210,7 @@
                       </a:pPr>
                       <a:r>
                         <a:rPr lang="en-US" sz="1600" dirty="0"/>
-                        <a:t>groupings in this hunt</a:t>
+                        <a:t>hunt in “pre-hunt” status</a:t>
                       </a:r>
                     </a:p>
                     <a:p>
@@ -4624,6 +5233,29 @@
                       </a:pPr>
                       <a:r>
                         <a:rPr lang="en-US" sz="1600" dirty="0"/>
+                        <a:t>groupings in this hunt</a:t>
+                      </a:r>
+                    </a:p>
+                    <a:p>
+                      <a:pPr marL="0" marR="0" lvl="0" indent="0" algn="l" defTabSz="914400" rtl="0" eaLnBrk="1" fontAlgn="auto" latinLnBrk="0" hangingPunct="1">
+                        <a:lnSpc>
+                          <a:spcPct val="100000"/>
+                        </a:lnSpc>
+                        <a:spcBef>
+                          <a:spcPts val="0"/>
+                        </a:spcBef>
+                        <a:spcAft>
+                          <a:spcPts val="0"/>
+                        </a:spcAft>
+                        <a:buClrTx/>
+                        <a:buSzTx/>
+                        <a:buFontTx/>
+                        <a:buNone/>
+                        <a:tabLst/>
+                        <a:defRPr/>
+                      </a:pPr>
+                      <a:r>
+                        <a:rPr lang="en-US" sz="1600" dirty="0"/>
                         <a:t>all users</a:t>
                       </a:r>
                     </a:p>
@@ -4703,42 +5335,7 @@
                     <a:bodyPr/>
                     <a:lstStyle/>
                     <a:p>
-                      <a:r>
-                        <a:rPr lang="en-US" sz="1400" dirty="0"/>
-                        <a:t>SELECT id, </a:t>
-                      </a:r>
-                      <a:r>
-                        <a:rPr lang="en-US" sz="1400" dirty="0" err="1"/>
-                        <a:t>hunt_date</a:t>
-                      </a:r>
-                      <a:r>
-                        <a:rPr lang="en-US" sz="1400" dirty="0"/>
-                        <a:t>, status FROM hunts WHERE status = '</a:t>
-                      </a:r>
-                      <a:r>
-                        <a:rPr lang="en-US" sz="1400" dirty="0" err="1"/>
-                        <a:t>signup_open</a:t>
-                      </a:r>
-                      <a:r>
-                        <a:rPr lang="en-US" sz="1400" dirty="0"/>
-                        <a:t>' OR status = '</a:t>
-                      </a:r>
-                      <a:r>
-                        <a:rPr lang="en-US" sz="1400" dirty="0" err="1"/>
-                        <a:t>signup_closed</a:t>
-                      </a:r>
-                      <a:r>
-                        <a:rPr lang="en-US" sz="1400" dirty="0"/>
-                        <a:t>' OR status='</a:t>
-                      </a:r>
-                      <a:r>
-                        <a:rPr lang="en-US" sz="1400" dirty="0" err="1"/>
-                        <a:t>draw_complete</a:t>
-                      </a:r>
-                      <a:r>
-                        <a:rPr lang="en-US" sz="1400" dirty="0"/>
-                        <a:t>'</a:t>
-                      </a:r>
+                      <a:endParaRPr lang="en-US" sz="1400" dirty="0"/>
                     </a:p>
                   </a:txBody>
                   <a:tcPr/>
@@ -4749,10 +5346,7 @@
                     <a:lstStyle/>
                     <a:p>
                       <a:pPr algn="ctr"/>
-                      <a:r>
-                        <a:rPr lang="en-US" sz="1400" dirty="0"/>
-                        <a:t>alpha</a:t>
-                      </a:r>
+                      <a:endParaRPr lang="en-US" sz="1400" dirty="0"/>
                     </a:p>
                   </a:txBody>
                   <a:tcPr marL="45720" marR="45720"/>
@@ -4763,10 +5357,7 @@
                     <a:lstStyle/>
                     <a:p>
                       <a:pPr algn="ctr"/>
-                      <a:r>
-                        <a:rPr lang="en-US" sz="1400" dirty="0"/>
-                        <a:t>10 min</a:t>
-                      </a:r>
+                      <a:endParaRPr lang="en-US" sz="1400" dirty="0"/>
                     </a:p>
                   </a:txBody>
                   <a:tcPr marL="45720" marR="45720"/>
@@ -4776,10 +5367,7 @@
                     <a:bodyPr/>
                     <a:lstStyle/>
                     <a:p>
-                      <a:r>
-                        <a:rPr lang="en-US" sz="1400" dirty="0"/>
-                        <a:t>hunt CUD</a:t>
-                      </a:r>
+                      <a:endParaRPr lang="en-US" sz="1400" dirty="0"/>
                     </a:p>
                   </a:txBody>
                   <a:tcPr marL="45720" marR="45720"/>
@@ -4895,31 +5483,31 @@
                     <a:lstStyle/>
                     <a:p>
                       <a:r>
-                        <a:rPr lang="en-US" sz="1400" dirty="0"/>
+                        <a:rPr lang="en-US" sz="1400" strike="sngStrike" dirty="0"/>
                         <a:t>SELECT id, </a:t>
                       </a:r>
                       <a:r>
-                        <a:rPr lang="en-US" sz="1400" dirty="0" err="1"/>
+                        <a:rPr lang="en-US" sz="1400" strike="sngStrike" dirty="0" err="1"/>
                         <a:t>first_name</a:t>
                       </a:r>
                       <a:r>
-                        <a:rPr lang="en-US" sz="1400" dirty="0"/>
+                        <a:rPr lang="en-US" sz="1400" strike="sngStrike" dirty="0"/>
                         <a:t>, </a:t>
                       </a:r>
                       <a:r>
-                        <a:rPr lang="en-US" sz="1400" dirty="0" err="1"/>
+                        <a:rPr lang="en-US" sz="1400" strike="sngStrike" dirty="0" err="1"/>
                         <a:t>last_name</a:t>
                       </a:r>
                       <a:r>
-                        <a:rPr lang="en-US" sz="1400" dirty="0"/>
+                        <a:rPr lang="en-US" sz="1400" strike="sngStrike" dirty="0"/>
                         <a:t>, </a:t>
                       </a:r>
                       <a:r>
-                        <a:rPr lang="en-US" sz="1400" dirty="0" err="1"/>
+                        <a:rPr lang="en-US" sz="1400" strike="sngStrike" dirty="0" err="1"/>
                         <a:t>public_id</a:t>
                       </a:r>
                       <a:r>
-                        <a:rPr lang="en-US" sz="1400" dirty="0"/>
+                        <a:rPr lang="en-US" sz="1400" strike="sngStrike" dirty="0"/>
                         <a:t> FROM users</a:t>
                       </a:r>
                     </a:p>
@@ -4933,10 +5521,10 @@
                     <a:p>
                       <a:pPr algn="ctr"/>
                       <a:r>
-                        <a:rPr lang="en-US" sz="1400" dirty="0" err="1"/>
+                        <a:rPr lang="en-US" sz="1400" strike="sngStrike" dirty="0" err="1"/>
                         <a:t>charlie</a:t>
                       </a:r>
-                      <a:endParaRPr lang="en-US" sz="1400" dirty="0"/>
+                      <a:endParaRPr lang="en-US" sz="1400" strike="sngStrike" dirty="0"/>
                     </a:p>
                   </a:txBody>
                   <a:tcPr marL="45720" marR="45720"/>
@@ -4948,7 +5536,7 @@
                     <a:p>
                       <a:pPr algn="ctr"/>
                       <a:r>
-                        <a:rPr lang="en-US" sz="1400" dirty="0"/>
+                        <a:rPr lang="en-US" sz="1400" strike="sngStrike" dirty="0"/>
                         <a:t>30 min</a:t>
                       </a:r>
                     </a:p>
@@ -4961,7 +5549,7 @@
                     <a:lstStyle/>
                     <a:p>
                       <a:r>
-                        <a:rPr lang="en-US" sz="1400" dirty="0"/>
+                        <a:rPr lang="en-US" sz="1400" strike="sngStrike" dirty="0"/>
                         <a:t>user CUD</a:t>
                       </a:r>
                     </a:p>
@@ -5911,7 +6499,7 @@
             <p:ph idx="4294967295"/>
             <p:extLst>
               <p:ext uri="{D42A27DB-BD31-4B8C-83A1-F6EECF244321}">
-                <p14:modId xmlns:p14="http://schemas.microsoft.com/office/powerpoint/2010/main" val="2050421694"/>
+                <p14:modId xmlns:p14="http://schemas.microsoft.com/office/powerpoint/2010/main" val="3818634364"/>
               </p:ext>
             </p:extLst>
           </p:nvPr>
@@ -6332,32 +6920,32 @@
                     <a:lstStyle/>
                     <a:p>
                       <a:r>
-                        <a:rPr lang="en-US" sz="1400" dirty="0"/>
+                        <a:rPr lang="en-US" sz="1400" strike="sngStrike" dirty="0"/>
                         <a:t>SELECT slot1_type, slot2_type, slot3_type, slot4_type, slot1_id, slot2_id, slot3_id, slot4_id, </a:t>
                       </a:r>
                       <a:r>
-                        <a:rPr lang="en-US" sz="1400" dirty="0" err="1"/>
+                        <a:rPr lang="en-US" sz="1400" strike="sngStrike" dirty="0" err="1"/>
                         <a:t>num_hunters</a:t>
                       </a:r>
-                      <a:endParaRPr lang="en-US" sz="1400" dirty="0"/>
-                    </a:p>
-                    <a:p>
-                      <a:r>
-                        <a:rPr lang="en-US" sz="1400" dirty="0"/>
+                      <a:endParaRPr lang="en-US" sz="1400" strike="sngStrike" dirty="0"/>
+                    </a:p>
+                    <a:p>
+                      <a:r>
+                        <a:rPr lang="en-US" sz="1400" strike="sngStrike" dirty="0"/>
                         <a:t>FROM groupings </a:t>
                       </a:r>
                     </a:p>
                     <a:p>
                       <a:r>
-                        <a:rPr lang="en-US" sz="1400" dirty="0"/>
+                        <a:rPr lang="en-US" sz="1400" strike="sngStrike" dirty="0"/>
                         <a:t>WHERE groupings.id={</a:t>
                       </a:r>
                       <a:r>
-                        <a:rPr lang="en-US" sz="1400" dirty="0" err="1"/>
+                        <a:rPr lang="en-US" sz="1400" strike="sngStrike" dirty="0" err="1"/>
                         <a:t>grouping_id</a:t>
                       </a:r>
                       <a:r>
-                        <a:rPr lang="en-US" sz="1400" dirty="0"/>
+                        <a:rPr lang="en-US" sz="1400" strike="sngStrike" dirty="0"/>
                         <a:t>}"</a:t>
                       </a:r>
                     </a:p>
@@ -6371,22 +6959,22 @@
                     <a:p>
                       <a:pPr algn="ctr"/>
                       <a:r>
-                        <a:rPr lang="en-US" sz="1400" dirty="0"/>
+                        <a:rPr lang="en-US" sz="1400" strike="sngStrike" dirty="0"/>
                         <a:t>hotel:[</a:t>
                       </a:r>
                       <a:r>
-                        <a:rPr lang="en-US" sz="1400" dirty="0" err="1"/>
+                        <a:rPr lang="en-US" sz="1400" strike="sngStrike" dirty="0" err="1"/>
                         <a:t>group_id</a:t>
                       </a:r>
                       <a:r>
-                        <a:rPr lang="en-US" sz="1400" dirty="0"/>
+                        <a:rPr lang="en-US" sz="1400" strike="sngStrike" dirty="0"/>
                         <a:t>]</a:t>
                       </a:r>
                     </a:p>
                     <a:p>
                       <a:pPr algn="ctr"/>
                       <a:r>
-                        <a:rPr lang="en-US" sz="1400" dirty="0"/>
+                        <a:rPr lang="en-US" sz="1400" strike="sngStrike" dirty="0"/>
                         <a:t>**used multiple places</a:t>
                       </a:r>
                     </a:p>
@@ -6400,7 +6988,7 @@
                     <a:p>
                       <a:pPr algn="ctr"/>
                       <a:r>
-                        <a:rPr lang="en-US" sz="1400" dirty="0"/>
+                        <a:rPr lang="en-US" sz="1400" strike="sngStrike" dirty="0"/>
                         <a:t>1 hour</a:t>
                       </a:r>
                     </a:p>
@@ -6413,11 +7001,11 @@
                     <a:lstStyle/>
                     <a:p>
                       <a:r>
-                        <a:rPr lang="en-US" sz="1400" dirty="0" err="1"/>
+                        <a:rPr lang="en-US" sz="1400" strike="sngStrike" dirty="0" err="1"/>
                         <a:t>group_id</a:t>
                       </a:r>
                       <a:r>
-                        <a:rPr lang="en-US" sz="1400" dirty="0"/>
+                        <a:rPr lang="en-US" sz="1400" strike="sngStrike" dirty="0"/>
                         <a:t> UD</a:t>
                       </a:r>
                     </a:p>
@@ -6448,23 +7036,7 @@
                     <a:p>
                       <a:r>
                         <a:rPr lang="en-US" sz="1400" dirty="0"/>
-                        <a:t>SELECT </a:t>
-                      </a:r>
-                      <a:r>
-                        <a:rPr lang="en-US" sz="1400" dirty="0" err="1"/>
-                        <a:t>first_name</a:t>
-                      </a:r>
-                      <a:r>
-                        <a:rPr lang="en-US" sz="1400" dirty="0"/>
-                        <a:t>, </a:t>
-                      </a:r>
-                      <a:r>
-                        <a:rPr lang="en-US" sz="1400" dirty="0" err="1"/>
-                        <a:t>last_name</a:t>
-                      </a:r>
-                      <a:r>
-                        <a:rPr lang="en-US" sz="1400" dirty="0"/>
-                        <a:t> FROM users WHERE …</a:t>
+                        <a:t>dictionary of participants names separated by member/guest</a:t>
                       </a:r>
                     </a:p>
                   </a:txBody>
@@ -6792,7 +7364,7 @@
             <p:ph idx="4294967295"/>
             <p:extLst>
               <p:ext uri="{D42A27DB-BD31-4B8C-83A1-F6EECF244321}">
-                <p14:modId xmlns:p14="http://schemas.microsoft.com/office/powerpoint/2010/main" val="1530696834"/>
+                <p14:modId xmlns:p14="http://schemas.microsoft.com/office/powerpoint/2010/main" val="1137853689"/>
               </p:ext>
             </p:extLst>
           </p:nvPr>
@@ -7366,21 +7938,8 @@
                     <a:lstStyle/>
                     <a:p>
                       <a:r>
-                        <a:rPr lang="en-US" sz="1400"/>
+                        <a:rPr lang="en-US" sz="1400" dirty="0"/>
                         <a:t>group CUD</a:t>
-                      </a:r>
-                    </a:p>
-                    <a:p>
-                      <a:endParaRPr lang="en-US" sz="1400" dirty="0"/>
-                    </a:p>
-                    <a:p>
-                      <a:r>
-                        <a:rPr lang="en-US" sz="1400" dirty="0" err="1"/>
-                        <a:t>harvest_update_time</a:t>
-                      </a:r>
-                      <a:r>
-                        <a:rPr lang="en-US" sz="1400" dirty="0"/>
-                        <a:t> change in harvests</a:t>
                       </a:r>
                     </a:p>
                   </a:txBody>
@@ -7409,32 +7968,32 @@
                     <a:lstStyle/>
                     <a:p>
                       <a:r>
-                        <a:rPr lang="en-US" sz="1400" dirty="0"/>
+                        <a:rPr lang="en-US" sz="1400" strike="sngStrike" dirty="0"/>
                         <a:t>SELECT slot1_type, slot2_type, slot3_type, slot4_type, slot1_id, slot2_id, slot3_id, slot4_id, </a:t>
                       </a:r>
                       <a:r>
-                        <a:rPr lang="en-US" sz="1400" dirty="0" err="1"/>
+                        <a:rPr lang="en-US" sz="1400" strike="sngStrike" dirty="0" err="1"/>
                         <a:t>num_hunters</a:t>
                       </a:r>
-                      <a:endParaRPr lang="en-US" sz="1400" dirty="0"/>
-                    </a:p>
-                    <a:p>
-                      <a:r>
-                        <a:rPr lang="en-US" sz="1400" dirty="0"/>
+                      <a:endParaRPr lang="en-US" sz="1400" strike="sngStrike" dirty="0"/>
+                    </a:p>
+                    <a:p>
+                      <a:r>
+                        <a:rPr lang="en-US" sz="1400" strike="sngStrike" dirty="0"/>
                         <a:t>FROM groupings</a:t>
                       </a:r>
                     </a:p>
                     <a:p>
                       <a:r>
-                        <a:rPr lang="en-US" sz="1400" dirty="0"/>
+                        <a:rPr lang="en-US" sz="1400" strike="sngStrike" dirty="0"/>
                         <a:t>WHERE id = {group['</a:t>
                       </a:r>
                       <a:r>
-                        <a:rPr lang="en-US" sz="1400" dirty="0" err="1"/>
+                        <a:rPr lang="en-US" sz="1400" strike="sngStrike" dirty="0" err="1"/>
                         <a:t>group_id</a:t>
                       </a:r>
                       <a:r>
-                        <a:rPr lang="en-US" sz="1400" dirty="0"/>
+                        <a:rPr lang="en-US" sz="1400" strike="sngStrike" dirty="0"/>
                         <a:t>']}</a:t>
                       </a:r>
                     </a:p>
@@ -7448,15 +8007,15 @@
                     <a:p>
                       <a:pPr algn="ctr"/>
                       <a:r>
-                        <a:rPr lang="en-US" sz="1400" dirty="0"/>
+                        <a:rPr lang="en-US" sz="1400" strike="sngStrike" dirty="0"/>
                         <a:t>hotel:[</a:t>
                       </a:r>
                       <a:r>
-                        <a:rPr lang="en-US" sz="1400" dirty="0" err="1"/>
+                        <a:rPr lang="en-US" sz="1400" strike="sngStrike" dirty="0" err="1"/>
                         <a:t>group_id</a:t>
                       </a:r>
                       <a:r>
-                        <a:rPr lang="en-US" sz="1400" dirty="0"/>
+                        <a:rPr lang="en-US" sz="1400" strike="sngStrike" dirty="0"/>
                         <a:t>]</a:t>
                       </a:r>
                     </a:p>
@@ -7479,7 +8038,7 @@
                         <a:defRPr/>
                       </a:pPr>
                       <a:r>
-                        <a:rPr lang="en-US" sz="1400" dirty="0"/>
+                        <a:rPr lang="en-US" sz="1400" strike="sngStrike" dirty="0"/>
                         <a:t>**used multiple places</a:t>
                       </a:r>
                     </a:p>
@@ -7493,7 +8052,7 @@
                     <a:p>
                       <a:pPr algn="ctr"/>
                       <a:r>
-                        <a:rPr lang="en-US" sz="1400" dirty="0"/>
+                        <a:rPr lang="en-US" sz="1400" strike="sngStrike" dirty="0"/>
                         <a:t>1 hour</a:t>
                       </a:r>
                     </a:p>
@@ -7506,11 +8065,11 @@
                     <a:lstStyle/>
                     <a:p>
                       <a:r>
-                        <a:rPr lang="en-US" sz="1400" dirty="0" err="1"/>
+                        <a:rPr lang="en-US" sz="1400" strike="sngStrike" dirty="0" err="1"/>
                         <a:t>group_id</a:t>
                       </a:r>
                       <a:r>
-                        <a:rPr lang="en-US" sz="1400" dirty="0"/>
+                        <a:rPr lang="en-US" sz="1400" strike="sngStrike" dirty="0"/>
                         <a:t> UD</a:t>
                       </a:r>
                     </a:p>
@@ -7813,7 +8372,7 @@
             <p:ph idx="4294967295"/>
             <p:extLst>
               <p:ext uri="{D42A27DB-BD31-4B8C-83A1-F6EECF244321}">
-                <p14:modId xmlns:p14="http://schemas.microsoft.com/office/powerpoint/2010/main" val="1161929232"/>
+                <p14:modId xmlns:p14="http://schemas.microsoft.com/office/powerpoint/2010/main" val="2637070568"/>
               </p:ext>
             </p:extLst>
           </p:nvPr>
@@ -8421,32 +8980,32 @@
                     <a:lstStyle/>
                     <a:p>
                       <a:r>
-                        <a:rPr lang="en-US" sz="1400" dirty="0"/>
+                        <a:rPr lang="en-US" sz="1400" strike="sngStrike" dirty="0"/>
                         <a:t>SELECT slot1_type, slot2_type, slot3_type, slot4_type, slot1_id, slot2_id, slot3_id, slot4_id, </a:t>
                       </a:r>
                       <a:r>
-                        <a:rPr lang="en-US" sz="1400" dirty="0" err="1"/>
+                        <a:rPr lang="en-US" sz="1400" strike="sngStrike" dirty="0" err="1"/>
                         <a:t>num_hunters</a:t>
                       </a:r>
-                      <a:endParaRPr lang="en-US" sz="1400" dirty="0"/>
-                    </a:p>
-                    <a:p>
-                      <a:r>
-                        <a:rPr lang="en-US" sz="1400" dirty="0"/>
+                      <a:endParaRPr lang="en-US" sz="1400" strike="sngStrike" dirty="0"/>
+                    </a:p>
+                    <a:p>
+                      <a:r>
+                        <a:rPr lang="en-US" sz="1400" strike="sngStrike" dirty="0"/>
                         <a:t>FROM groupings</a:t>
                       </a:r>
                     </a:p>
                     <a:p>
                       <a:r>
-                        <a:rPr lang="en-US" sz="1400" dirty="0"/>
+                        <a:rPr lang="en-US" sz="1400" strike="sngStrike" dirty="0"/>
                         <a:t>WHERE id = {group['</a:t>
                       </a:r>
                       <a:r>
-                        <a:rPr lang="en-US" sz="1400" dirty="0" err="1"/>
+                        <a:rPr lang="en-US" sz="1400" strike="sngStrike" dirty="0" err="1"/>
                         <a:t>group_id</a:t>
                       </a:r>
                       <a:r>
-                        <a:rPr lang="en-US" sz="1400" dirty="0"/>
+                        <a:rPr lang="en-US" sz="1400" strike="sngStrike" dirty="0"/>
                         <a:t>']}</a:t>
                       </a:r>
                     </a:p>
@@ -8460,15 +9019,15 @@
                     <a:p>
                       <a:pPr algn="ctr"/>
                       <a:r>
-                        <a:rPr lang="en-US" sz="1400" dirty="0"/>
+                        <a:rPr lang="en-US" sz="1400" strike="sngStrike" dirty="0"/>
                         <a:t>hotel:[</a:t>
                       </a:r>
                       <a:r>
-                        <a:rPr lang="en-US" sz="1400" dirty="0" err="1"/>
+                        <a:rPr lang="en-US" sz="1400" strike="sngStrike" dirty="0" err="1"/>
                         <a:t>group_id</a:t>
                       </a:r>
                       <a:r>
-                        <a:rPr lang="en-US" sz="1400" dirty="0"/>
+                        <a:rPr lang="en-US" sz="1400" strike="sngStrike" dirty="0"/>
                         <a:t>]</a:t>
                       </a:r>
                     </a:p>
@@ -8491,7 +9050,7 @@
                         <a:defRPr/>
                       </a:pPr>
                       <a:r>
-                        <a:rPr lang="en-US" sz="1400" dirty="0"/>
+                        <a:rPr lang="en-US" sz="1400" strike="sngStrike" dirty="0"/>
                         <a:t>**used multiple places</a:t>
                       </a:r>
                     </a:p>
@@ -8505,7 +9064,7 @@
                     <a:p>
                       <a:pPr algn="ctr"/>
                       <a:r>
-                        <a:rPr lang="en-US" sz="1400" dirty="0"/>
+                        <a:rPr lang="en-US" sz="1400" strike="sngStrike" dirty="0"/>
                         <a:t>1 hour</a:t>
                       </a:r>
                     </a:p>
@@ -8518,11 +9077,11 @@
                     <a:lstStyle/>
                     <a:p>
                       <a:r>
-                        <a:rPr lang="en-US" sz="1400" dirty="0" err="1"/>
+                        <a:rPr lang="en-US" sz="1400" strike="sngStrike" dirty="0" err="1"/>
                         <a:t>group_id</a:t>
                       </a:r>
                       <a:r>
-                        <a:rPr lang="en-US" sz="1400" dirty="0"/>
+                        <a:rPr lang="en-US" sz="1400" strike="sngStrike" dirty="0"/>
                         <a:t> UD</a:t>
                       </a:r>
                     </a:p>
@@ -8585,7 +9144,7 @@
             <p:ph idx="4294967295"/>
             <p:extLst>
               <p:ext uri="{D42A27DB-BD31-4B8C-83A1-F6EECF244321}">
-                <p14:modId xmlns:p14="http://schemas.microsoft.com/office/powerpoint/2010/main" val="4203962774"/>
+                <p14:modId xmlns:p14="http://schemas.microsoft.com/office/powerpoint/2010/main" val="2124508720"/>
               </p:ext>
             </p:extLst>
           </p:nvPr>
@@ -9260,7 +9819,19 @@
                       </a:r>
                       <a:r>
                         <a:rPr lang="en-US" sz="1400" dirty="0"/>
-                        <a:t> FROM users u INNER JOIN groupings g ON u.id = g.slot1_id OR u.id = g.slot2_id OR u.id = slot3_id OR u.id = slot4_id WHERE g.id = {</a:t>
+                        <a:t> FROM users u JOIN participants p ON p.user_id=u.</a:t>
+                      </a:r>
+                      <a:r>
+                        <a:rPr lang="en-US" sz="1400"/>
+                        <a:t>id WHERE </a:t>
+                      </a:r>
+                      <a:r>
+                        <a:rPr lang="en-US" sz="1400" dirty="0" err="1"/>
+                        <a:t>p.grouping_id</a:t>
+                      </a:r>
+                      <a:r>
+                        <a:rPr lang="en-US" sz="1400" dirty="0"/>
+                        <a:t> = {</a:t>
                       </a:r>
                       <a:r>
                         <a:rPr lang="en-US" sz="1400" dirty="0" err="1"/>

</xml_diff>